<commit_message>
Update project slides for demo
</commit_message>
<xml_diff>
--- a/docs/HobbyCircles_Slides.pptx.pptx
+++ b/docs/HobbyCircles_Slides.pptx.pptx
@@ -1,12 +1,16 @@
 
 <file path=ppt/presentation.xml><?xml version="1.0" encoding="utf-8"?>
-<p:presentation xmlns:a="http://schemas.openxmlformats.org/drawingml/2006/main" xmlns:r="http://schemas.openxmlformats.org/officeDocument/2006/relationships" xmlns:p="http://schemas.openxmlformats.org/presentationml/2006/main" saveSubsetFonts="1">
+<p:presentation xmlns:a="http://schemas.openxmlformats.org/drawingml/2006/main" xmlns:r="http://schemas.openxmlformats.org/officeDocument/2006/relationships" xmlns:p="http://schemas.openxmlformats.org/presentationml/2006/main">
   <p:sldMasterIdLst>
-    <p:sldMasterId id="2147483721" r:id="rId1"/>
+    <p:sldMasterId id="2147483648" r:id="rId1"/>
   </p:sldMasterIdLst>
+  <p:notesMasterIdLst>
+    <p:notesMasterId r:id="rId5"/>
+  </p:notesMasterIdLst>
   <p:sldIdLst>
-    <p:sldId id="257" r:id="rId2"/>
-    <p:sldId id="258" r:id="rId3"/>
+    <p:sldId id="257" r:id="rId3"/>
+    <p:sldId id="258" r:id="rId4"/>
+    <p:sldId id="259" r:id="rId6"/>
   </p:sldIdLst>
   <p:sldSz cx="12192000" cy="6858000"/>
   <p:notesSz cx="6858000" cy="9144000"/>
@@ -105,561 +109,402 @@
       </a:defRPr>
     </a:lvl9pPr>
   </p:defaultTextStyle>
-  <p:extLst>
-    <p:ext uri="{EFAFB233-063F-42B5-8137-9DF3F51BA10A}">
-      <p15:sldGuideLst xmlns:p15="http://schemas.microsoft.com/office/powerpoint/2012/main"/>
-    </p:ext>
-  </p:extLst>
 </p:presentation>
 </file>
 
-<file path=ppt/revisionInfo.xml><?xml version="1.0" encoding="utf-8"?>
-<p1510:revInfo xmlns:a="http://schemas.openxmlformats.org/drawingml/2006/main" xmlns:r="http://schemas.openxmlformats.org/officeDocument/2006/relationships" xmlns:p1510="http://schemas.microsoft.com/office/powerpoint/2015/10/main">
-  <p1510:revLst>
-    <p1510:client id="{E13F7B84-C3C8-A2D5-A86A-58D1205AB694}" v="40" dt="2026-02-17T01:10:49.580"/>
-  </p1510:revLst>
-</p1510:revInfo>
+<file path=ppt/notesMasters/notesMaster1.xml><?xml version="1.0" encoding="utf-8"?>
+<p:notesMaster xmlns:a="http://schemas.openxmlformats.org/drawingml/2006/main" xmlns:r="http://schemas.openxmlformats.org/officeDocument/2006/relationships" xmlns:p="http://schemas.openxmlformats.org/presentationml/2006/main">
+  <p:cSld>
+    <p:bg>
+      <p:bgRef idx="1001">
+        <a:schemeClr val="bg1"/>
+      </p:bgRef>
+    </p:bg>
+    <p:spTree>
+      <p:nvGrpSpPr>
+        <p:cNvPr id="1" name=""/>
+        <p:cNvGrpSpPr/>
+        <p:nvPr/>
+      </p:nvGrpSpPr>
+      <p:grpSpPr>
+        <a:xfrm>
+          <a:off x="0" y="0"/>
+          <a:ext cx="0" cy="0"/>
+          <a:chOff x="0" y="0"/>
+          <a:chExt cx="0" cy="0"/>
+        </a:xfrm>
+      </p:grpSpPr>
+      <p:sp>
+        <p:nvSpPr>
+          <p:cNvPr id="2" name="Header Placeholder 1"/>
+          <p:cNvSpPr>
+            <a:spLocks noGrp="1"/>
+          </p:cNvSpPr>
+          <p:nvPr>
+            <p:ph type="hdr" sz="quarter"/>
+          </p:nvPr>
+        </p:nvSpPr>
+        <p:spPr>
+          <a:xfrm>
+            <a:off x="0" y="0"/>
+            <a:ext cx="2971800" cy="458788"/>
+          </a:xfrm>
+          <a:prstGeom prst="rect">
+            <a:avLst/>
+          </a:prstGeom>
+        </p:spPr>
+        <p:txBody>
+          <a:bodyPr vert="horz" lIns="91440" tIns="45720" rIns="91440" bIns="45720" rtlCol="0"/>
+          <a:lstStyle>
+            <a:lvl1pPr algn="l">
+              <a:defRPr sz="1200"/>
+            </a:lvl1pPr>
+          </a:lstStyle>
+          <a:p>
+            <a:endParaRPr lang="en-US"/>
+          </a:p>
+        </p:txBody>
+      </p:sp>
+      <p:sp>
+        <p:nvSpPr>
+          <p:cNvPr id="3" name="Date Placeholder 2"/>
+          <p:cNvSpPr>
+            <a:spLocks noGrp="1"/>
+          </p:cNvSpPr>
+          <p:nvPr>
+            <p:ph type="dt" idx="1"/>
+          </p:nvPr>
+        </p:nvSpPr>
+        <p:spPr>
+          <a:xfrm>
+            <a:off x="3884613" y="0"/>
+            <a:ext cx="2971800" cy="458788"/>
+          </a:xfrm>
+          <a:prstGeom prst="rect">
+            <a:avLst/>
+          </a:prstGeom>
+        </p:spPr>
+        <p:txBody>
+          <a:bodyPr vert="horz" lIns="91440" tIns="45720" rIns="91440" bIns="45720" rtlCol="0"/>
+          <a:lstStyle>
+            <a:lvl1pPr algn="r">
+              <a:defRPr sz="1200"/>
+            </a:lvl1pPr>
+          </a:lstStyle>
+          <a:p>
+            <a:fld id="{3EFD42F7-718C-4B98-AAEC-167E6DDD60A7}" type="datetimeFigureOut">
+              <a:rPr lang="en-US" smtClean="0"/>
+            </a:fld>
+            <a:endParaRPr lang="en-US"/>
+          </a:p>
+        </p:txBody>
+      </p:sp>
+      <p:sp>
+        <p:nvSpPr>
+          <p:cNvPr id="4" name="Slide Image Placeholder 3"/>
+          <p:cNvSpPr>
+            <a:spLocks noGrp="1" noRot="1" noChangeAspect="1"/>
+          </p:cNvSpPr>
+          <p:nvPr>
+            <p:ph type="sldImg" idx="2"/>
+          </p:nvPr>
+        </p:nvSpPr>
+        <p:spPr>
+          <a:xfrm>
+            <a:off x="685800" y="1143000"/>
+            <a:ext cx="5486400" cy="3086100"/>
+          </a:xfrm>
+          <a:prstGeom prst="rect">
+            <a:avLst/>
+          </a:prstGeom>
+          <a:noFill/>
+          <a:ln w="12700">
+            <a:solidFill>
+              <a:prstClr val="black"/>
+            </a:solidFill>
+          </a:ln>
+        </p:spPr>
+        <p:txBody>
+          <a:bodyPr vert="horz" lIns="91440" tIns="45720" rIns="91440" bIns="45720" rtlCol="0" anchor="ctr"/>
+          <a:lstStyle/>
+          <a:p>
+            <a:endParaRPr lang="en-US"/>
+          </a:p>
+        </p:txBody>
+      </p:sp>
+      <p:sp>
+        <p:nvSpPr>
+          <p:cNvPr id="5" name="Notes Placeholder 4"/>
+          <p:cNvSpPr>
+            <a:spLocks noGrp="1"/>
+          </p:cNvSpPr>
+          <p:nvPr>
+            <p:ph type="body" sz="quarter" idx="3"/>
+          </p:nvPr>
+        </p:nvSpPr>
+        <p:spPr>
+          <a:xfrm>
+            <a:off x="685800" y="4400550"/>
+            <a:ext cx="5486400" cy="3600450"/>
+          </a:xfrm>
+          <a:prstGeom prst="rect">
+            <a:avLst/>
+          </a:prstGeom>
+        </p:spPr>
+        <p:txBody>
+          <a:bodyPr vert="horz" lIns="91440" tIns="45720" rIns="91440" bIns="45720" rtlCol="0"/>
+          <a:lstStyle/>
+          <a:p>
+            <a:pPr lvl="0"/>
+            <a:r>
+              <a:rPr lang="en-US" smtClean="0"/>
+              <a:t>Click to edit Master text styles</a:t>
+            </a:r>
+            <a:endParaRPr lang="en-US" smtClean="0"/>
+          </a:p>
+          <a:p>
+            <a:pPr lvl="1"/>
+            <a:r>
+              <a:rPr lang="en-US" smtClean="0"/>
+              <a:t>Second level</a:t>
+            </a:r>
+            <a:endParaRPr lang="en-US" smtClean="0"/>
+          </a:p>
+          <a:p>
+            <a:pPr lvl="2"/>
+            <a:r>
+              <a:rPr lang="en-US" smtClean="0"/>
+              <a:t>Third level</a:t>
+            </a:r>
+            <a:endParaRPr lang="en-US" smtClean="0"/>
+          </a:p>
+          <a:p>
+            <a:pPr lvl="3"/>
+            <a:r>
+              <a:rPr lang="en-US" smtClean="0"/>
+              <a:t>Fourth level</a:t>
+            </a:r>
+            <a:endParaRPr lang="en-US" smtClean="0"/>
+          </a:p>
+          <a:p>
+            <a:pPr lvl="4"/>
+            <a:r>
+              <a:rPr lang="en-US" smtClean="0"/>
+              <a:t>Fifth level</a:t>
+            </a:r>
+            <a:endParaRPr lang="en-US"/>
+          </a:p>
+        </p:txBody>
+      </p:sp>
+      <p:sp>
+        <p:nvSpPr>
+          <p:cNvPr id="6" name="Footer Placeholder 5"/>
+          <p:cNvSpPr>
+            <a:spLocks noGrp="1"/>
+          </p:cNvSpPr>
+          <p:nvPr>
+            <p:ph type="ftr" sz="quarter" idx="4"/>
+          </p:nvPr>
+        </p:nvSpPr>
+        <p:spPr>
+          <a:xfrm>
+            <a:off x="0" y="8685213"/>
+            <a:ext cx="2971800" cy="458787"/>
+          </a:xfrm>
+          <a:prstGeom prst="rect">
+            <a:avLst/>
+          </a:prstGeom>
+        </p:spPr>
+        <p:txBody>
+          <a:bodyPr vert="horz" lIns="91440" tIns="45720" rIns="91440" bIns="45720" rtlCol="0" anchor="b"/>
+          <a:lstStyle>
+            <a:lvl1pPr algn="l">
+              <a:defRPr sz="1200"/>
+            </a:lvl1pPr>
+          </a:lstStyle>
+          <a:p>
+            <a:endParaRPr lang="en-US"/>
+          </a:p>
+        </p:txBody>
+      </p:sp>
+      <p:sp>
+        <p:nvSpPr>
+          <p:cNvPr id="7" name="Slide Number Placeholder 6"/>
+          <p:cNvSpPr>
+            <a:spLocks noGrp="1"/>
+          </p:cNvSpPr>
+          <p:nvPr>
+            <p:ph type="sldNum" sz="quarter" idx="5"/>
+          </p:nvPr>
+        </p:nvSpPr>
+        <p:spPr>
+          <a:xfrm>
+            <a:off x="3884613" y="8685213"/>
+            <a:ext cx="2971800" cy="458787"/>
+          </a:xfrm>
+          <a:prstGeom prst="rect">
+            <a:avLst/>
+          </a:prstGeom>
+        </p:spPr>
+        <p:txBody>
+          <a:bodyPr vert="horz" lIns="91440" tIns="45720" rIns="91440" bIns="45720" rtlCol="0" anchor="b"/>
+          <a:lstStyle>
+            <a:lvl1pPr algn="r">
+              <a:defRPr sz="1200"/>
+            </a:lvl1pPr>
+          </a:lstStyle>
+          <a:p>
+            <a:fld id="{21B2AA4F-B828-4D7C-AFD3-893933DAFCB4}" type="slidenum">
+              <a:rPr lang="en-US" smtClean="0"/>
+            </a:fld>
+            <a:endParaRPr lang="en-US"/>
+          </a:p>
+        </p:txBody>
+      </p:sp>
+    </p:spTree>
+  </p:cSld>
+  <p:clrMap bg1="lt1" tx1="dk1" bg2="lt2" tx2="dk2" accent1="accent1" accent2="accent2" accent3="accent3" accent4="accent4" accent5="accent5" accent6="accent6" hlink="hlink" folHlink="folHlink"/>
+  <p:notesStyle>
+    <a:lvl1pPr marL="0" algn="l" defTabSz="914400" rtl="0" eaLnBrk="1" latinLnBrk="0" hangingPunct="1">
+      <a:defRPr sz="1200" kern="1200">
+        <a:solidFill>
+          <a:schemeClr val="tx1"/>
+        </a:solidFill>
+        <a:latin typeface="+mn-lt"/>
+        <a:ea typeface="+mn-ea"/>
+        <a:cs typeface="+mn-cs"/>
+      </a:defRPr>
+    </a:lvl1pPr>
+    <a:lvl2pPr marL="457200" algn="l" defTabSz="914400" rtl="0" eaLnBrk="1" latinLnBrk="0" hangingPunct="1">
+      <a:defRPr sz="1200" kern="1200">
+        <a:solidFill>
+          <a:schemeClr val="tx1"/>
+        </a:solidFill>
+        <a:latin typeface="+mn-lt"/>
+        <a:ea typeface="+mn-ea"/>
+        <a:cs typeface="+mn-cs"/>
+      </a:defRPr>
+    </a:lvl2pPr>
+    <a:lvl3pPr marL="914400" algn="l" defTabSz="914400" rtl="0" eaLnBrk="1" latinLnBrk="0" hangingPunct="1">
+      <a:defRPr sz="1200" kern="1200">
+        <a:solidFill>
+          <a:schemeClr val="tx1"/>
+        </a:solidFill>
+        <a:latin typeface="+mn-lt"/>
+        <a:ea typeface="+mn-ea"/>
+        <a:cs typeface="+mn-cs"/>
+      </a:defRPr>
+    </a:lvl3pPr>
+    <a:lvl4pPr marL="1371600" algn="l" defTabSz="914400" rtl="0" eaLnBrk="1" latinLnBrk="0" hangingPunct="1">
+      <a:defRPr sz="1200" kern="1200">
+        <a:solidFill>
+          <a:schemeClr val="tx1"/>
+        </a:solidFill>
+        <a:latin typeface="+mn-lt"/>
+        <a:ea typeface="+mn-ea"/>
+        <a:cs typeface="+mn-cs"/>
+      </a:defRPr>
+    </a:lvl4pPr>
+    <a:lvl5pPr marL="1828800" algn="l" defTabSz="914400" rtl="0" eaLnBrk="1" latinLnBrk="0" hangingPunct="1">
+      <a:defRPr sz="1200" kern="1200">
+        <a:solidFill>
+          <a:schemeClr val="tx1"/>
+        </a:solidFill>
+        <a:latin typeface="+mn-lt"/>
+        <a:ea typeface="+mn-ea"/>
+        <a:cs typeface="+mn-cs"/>
+      </a:defRPr>
+    </a:lvl5pPr>
+    <a:lvl6pPr marL="2286000" algn="l" defTabSz="914400" rtl="0" eaLnBrk="1" latinLnBrk="0" hangingPunct="1">
+      <a:defRPr sz="1200" kern="1200">
+        <a:solidFill>
+          <a:schemeClr val="tx1"/>
+        </a:solidFill>
+        <a:latin typeface="+mn-lt"/>
+        <a:ea typeface="+mn-ea"/>
+        <a:cs typeface="+mn-cs"/>
+      </a:defRPr>
+    </a:lvl6pPr>
+    <a:lvl7pPr marL="2743200" algn="l" defTabSz="914400" rtl="0" eaLnBrk="1" latinLnBrk="0" hangingPunct="1">
+      <a:defRPr sz="1200" kern="1200">
+        <a:solidFill>
+          <a:schemeClr val="tx1"/>
+        </a:solidFill>
+        <a:latin typeface="+mn-lt"/>
+        <a:ea typeface="+mn-ea"/>
+        <a:cs typeface="+mn-cs"/>
+      </a:defRPr>
+    </a:lvl7pPr>
+    <a:lvl8pPr marL="3200400" algn="l" defTabSz="914400" rtl="0" eaLnBrk="1" latinLnBrk="0" hangingPunct="1">
+      <a:defRPr sz="1200" kern="1200">
+        <a:solidFill>
+          <a:schemeClr val="tx1"/>
+        </a:solidFill>
+        <a:latin typeface="+mn-lt"/>
+        <a:ea typeface="+mn-ea"/>
+        <a:cs typeface="+mn-cs"/>
+      </a:defRPr>
+    </a:lvl8pPr>
+    <a:lvl9pPr marL="3657600" algn="l" defTabSz="914400" rtl="0" eaLnBrk="1" latinLnBrk="0" hangingPunct="1">
+      <a:defRPr sz="1200" kern="1200">
+        <a:solidFill>
+          <a:schemeClr val="tx1"/>
+        </a:solidFill>
+        <a:latin typeface="+mn-lt"/>
+        <a:ea typeface="+mn-ea"/>
+        <a:cs typeface="+mn-cs"/>
+      </a:defRPr>
+    </a:lvl9pPr>
+  </p:notesStyle>
+</p:notesMaster>
 </file>
 
-<file path=ppt/changesInfos/changesInfo1.xml><?xml version="1.0" encoding="utf-8"?>
-<pc:chgInfo xmlns:a="http://schemas.openxmlformats.org/drawingml/2006/main" xmlns:r="http://schemas.openxmlformats.org/officeDocument/2006/relationships" xmlns:ac="http://schemas.microsoft.com/office/drawing/2013/main/command" xmlns:pc="http://schemas.microsoft.com/office/powerpoint/2013/main/command">
-  <pc:docChgLst>
-    <pc:chgData name="Yashwanth Sai Vanukuru" userId="S::y_vanukuru@uncg.edu::a954039b-0d8c-423d-a820-0a09a0a7b36c" providerId="AD" clId="Web-{E13F7B84-C3C8-A2D5-A86A-58D1205AB694}"/>
-    <pc:docChg chg="addSld delSld modSld addMainMaster delMainMaster">
-      <pc:chgData name="Yashwanth Sai Vanukuru" userId="S::y_vanukuru@uncg.edu::a954039b-0d8c-423d-a820-0a09a0a7b36c" providerId="AD" clId="Web-{E13F7B84-C3C8-A2D5-A86A-58D1205AB694}" dt="2026-02-17T01:10:49.580" v="45" actId="1076"/>
-      <pc:docMkLst>
-        <pc:docMk/>
-      </pc:docMkLst>
-      <pc:sldChg chg="del">
-        <pc:chgData name="Yashwanth Sai Vanukuru" userId="S::y_vanukuru@uncg.edu::a954039b-0d8c-423d-a820-0a09a0a7b36c" providerId="AD" clId="Web-{E13F7B84-C3C8-A2D5-A86A-58D1205AB694}" dt="2026-02-17T00:57:27.036" v="0"/>
-        <pc:sldMkLst>
-          <pc:docMk/>
-          <pc:sldMk cId="109857222" sldId="256"/>
-        </pc:sldMkLst>
-      </pc:sldChg>
-      <pc:sldChg chg="addSp delSp modSp new del mod setBg modClrScheme setClrOvrMap chgLayout">
-        <pc:chgData name="Yashwanth Sai Vanukuru" userId="S::y_vanukuru@uncg.edu::a954039b-0d8c-423d-a820-0a09a0a7b36c" providerId="AD" clId="Web-{E13F7B84-C3C8-A2D5-A86A-58D1205AB694}" dt="2026-02-17T00:59:45.403" v="11"/>
-        <pc:sldMkLst>
-          <pc:docMk/>
-          <pc:sldMk cId="137470720" sldId="256"/>
-        </pc:sldMkLst>
-        <pc:spChg chg="mod">
-          <ac:chgData name="Yashwanth Sai Vanukuru" userId="S::y_vanukuru@uncg.edu::a954039b-0d8c-423d-a820-0a09a0a7b36c" providerId="AD" clId="Web-{E13F7B84-C3C8-A2D5-A86A-58D1205AB694}" dt="2026-02-17T00:59:34.496" v="10"/>
-          <ac:spMkLst>
-            <pc:docMk/>
-            <pc:sldMk cId="137470720" sldId="256"/>
-            <ac:spMk id="2" creationId="{614B8178-D5F4-DFFF-E206-297DF6C4EAAF}"/>
-          </ac:spMkLst>
-        </pc:spChg>
-        <pc:spChg chg="mod">
-          <ac:chgData name="Yashwanth Sai Vanukuru" userId="S::y_vanukuru@uncg.edu::a954039b-0d8c-423d-a820-0a09a0a7b36c" providerId="AD" clId="Web-{E13F7B84-C3C8-A2D5-A86A-58D1205AB694}" dt="2026-02-17T00:59:34.496" v="10"/>
-          <ac:spMkLst>
-            <pc:docMk/>
-            <pc:sldMk cId="137470720" sldId="256"/>
-            <ac:spMk id="3" creationId="{7A1163AB-1B13-7B09-49CC-B0CDC9FA76B9}"/>
-          </ac:spMkLst>
-        </pc:spChg>
-        <pc:spChg chg="add del">
-          <ac:chgData name="Yashwanth Sai Vanukuru" userId="S::y_vanukuru@uncg.edu::a954039b-0d8c-423d-a820-0a09a0a7b36c" providerId="AD" clId="Web-{E13F7B84-C3C8-A2D5-A86A-58D1205AB694}" dt="2026-02-17T00:59:29.230" v="7"/>
-          <ac:spMkLst>
-            <pc:docMk/>
-            <pc:sldMk cId="137470720" sldId="256"/>
-            <ac:spMk id="9" creationId="{B7E2F724-2FB3-4D1D-A730-739B8654C030}"/>
-          </ac:spMkLst>
-        </pc:spChg>
-        <pc:spChg chg="add del">
-          <ac:chgData name="Yashwanth Sai Vanukuru" userId="S::y_vanukuru@uncg.edu::a954039b-0d8c-423d-a820-0a09a0a7b36c" providerId="AD" clId="Web-{E13F7B84-C3C8-A2D5-A86A-58D1205AB694}" dt="2026-02-17T00:59:29.230" v="7"/>
-          <ac:spMkLst>
-            <pc:docMk/>
-            <pc:sldMk cId="137470720" sldId="256"/>
-            <ac:spMk id="11" creationId="{B2C335F7-F61C-4EB4-80F2-4B1438FE66BB}"/>
-          </ac:spMkLst>
-        </pc:spChg>
-        <pc:spChg chg="add del">
-          <ac:chgData name="Yashwanth Sai Vanukuru" userId="S::y_vanukuru@uncg.edu::a954039b-0d8c-423d-a820-0a09a0a7b36c" providerId="AD" clId="Web-{E13F7B84-C3C8-A2D5-A86A-58D1205AB694}" dt="2026-02-17T00:59:34.449" v="9"/>
-          <ac:spMkLst>
-            <pc:docMk/>
-            <pc:sldMk cId="137470720" sldId="256"/>
-            <ac:spMk id="13" creationId="{CFD1D2CD-954D-4C4D-B505-05EAD159B230}"/>
-          </ac:spMkLst>
-        </pc:spChg>
-        <pc:spChg chg="add">
-          <ac:chgData name="Yashwanth Sai Vanukuru" userId="S::y_vanukuru@uncg.edu::a954039b-0d8c-423d-a820-0a09a0a7b36c" providerId="AD" clId="Web-{E13F7B84-C3C8-A2D5-A86A-58D1205AB694}" dt="2026-02-17T00:59:34.496" v="10"/>
-          <ac:spMkLst>
-            <pc:docMk/>
-            <pc:sldMk cId="137470720" sldId="256"/>
-            <ac:spMk id="16" creationId="{9B65F7F7-2FCE-8F01-53DE-15C39342BE99}"/>
-          </ac:spMkLst>
-        </pc:spChg>
-        <pc:picChg chg="add mod ord">
-          <ac:chgData name="Yashwanth Sai Vanukuru" userId="S::y_vanukuru@uncg.edu::a954039b-0d8c-423d-a820-0a09a0a7b36c" providerId="AD" clId="Web-{E13F7B84-C3C8-A2D5-A86A-58D1205AB694}" dt="2026-02-17T00:59:34.496" v="10"/>
-          <ac:picMkLst>
-            <pc:docMk/>
-            <pc:sldMk cId="137470720" sldId="256"/>
-            <ac:picMk id="4" creationId="{3357080D-BECA-9625-E7F1-A5D7FAFD9B41}"/>
-          </ac:picMkLst>
-        </pc:picChg>
-        <pc:cxnChg chg="add del">
-          <ac:chgData name="Yashwanth Sai Vanukuru" userId="S::y_vanukuru@uncg.edu::a954039b-0d8c-423d-a820-0a09a0a7b36c" providerId="AD" clId="Web-{E13F7B84-C3C8-A2D5-A86A-58D1205AB694}" dt="2026-02-17T00:59:34.449" v="9"/>
-          <ac:cxnSpMkLst>
-            <pc:docMk/>
-            <pc:sldMk cId="137470720" sldId="256"/>
-            <ac:cxnSpMk id="14" creationId="{D132AEA7-A24A-45A9-BF8F-D0AFF34DF68C}"/>
-          </ac:cxnSpMkLst>
-        </pc:cxnChg>
-      </pc:sldChg>
-      <pc:sldChg chg="new del">
-        <pc:chgData name="Yashwanth Sai Vanukuru" userId="S::y_vanukuru@uncg.edu::a954039b-0d8c-423d-a820-0a09a0a7b36c" providerId="AD" clId="Web-{E13F7B84-C3C8-A2D5-A86A-58D1205AB694}" dt="2026-02-17T01:00:40.436" v="14"/>
-        <pc:sldMkLst>
-          <pc:docMk/>
-          <pc:sldMk cId="3519726243" sldId="256"/>
-        </pc:sldMkLst>
-      </pc:sldChg>
-      <pc:sldChg chg="addSp delSp modSp new mod setBg">
-        <pc:chgData name="Yashwanth Sai Vanukuru" userId="S::y_vanukuru@uncg.edu::a954039b-0d8c-423d-a820-0a09a0a7b36c" providerId="AD" clId="Web-{E13F7B84-C3C8-A2D5-A86A-58D1205AB694}" dt="2026-02-17T01:10:32.688" v="42" actId="14100"/>
-        <pc:sldMkLst>
-          <pc:docMk/>
-          <pc:sldMk cId="3320114388" sldId="257"/>
-        </pc:sldMkLst>
-        <pc:spChg chg="add del">
-          <ac:chgData name="Yashwanth Sai Vanukuru" userId="S::y_vanukuru@uncg.edu::a954039b-0d8c-423d-a820-0a09a0a7b36c" providerId="AD" clId="Web-{E13F7B84-C3C8-A2D5-A86A-58D1205AB694}" dt="2026-02-17T01:03:26.864" v="24"/>
-          <ac:spMkLst>
-            <pc:docMk/>
-            <pc:sldMk cId="3320114388" sldId="257"/>
-            <ac:spMk id="8" creationId="{35D3817B-01DA-DCDA-FA18-49D6FF003762}"/>
-          </ac:spMkLst>
-        </pc:spChg>
-        <pc:spChg chg="add">
-          <ac:chgData name="Yashwanth Sai Vanukuru" userId="S::y_vanukuru@uncg.edu::a954039b-0d8c-423d-a820-0a09a0a7b36c" providerId="AD" clId="Web-{E13F7B84-C3C8-A2D5-A86A-58D1205AB694}" dt="2026-02-17T01:03:26.958" v="25"/>
-          <ac:spMkLst>
-            <pc:docMk/>
-            <pc:sldMk cId="3320114388" sldId="257"/>
-            <ac:spMk id="10" creationId="{4D210342-C3F4-5EAC-3A4D-4770C07F3854}"/>
-          </ac:spMkLst>
-        </pc:spChg>
-        <pc:picChg chg="add del mod">
-          <ac:chgData name="Yashwanth Sai Vanukuru" userId="S::y_vanukuru@uncg.edu::a954039b-0d8c-423d-a820-0a09a0a7b36c" providerId="AD" clId="Web-{E13F7B84-C3C8-A2D5-A86A-58D1205AB694}" dt="2026-02-17T01:01:16.110" v="16"/>
-          <ac:picMkLst>
-            <pc:docMk/>
-            <pc:sldMk cId="3320114388" sldId="257"/>
-            <ac:picMk id="2" creationId="{1BF995E1-CA9C-C179-BA2A-7D118AE35116}"/>
-          </ac:picMkLst>
-        </pc:picChg>
-        <pc:picChg chg="add mod">
-          <ac:chgData name="Yashwanth Sai Vanukuru" userId="S::y_vanukuru@uncg.edu::a954039b-0d8c-423d-a820-0a09a0a7b36c" providerId="AD" clId="Web-{E13F7B84-C3C8-A2D5-A86A-58D1205AB694}" dt="2026-02-17T01:10:32.688" v="42" actId="14100"/>
-          <ac:picMkLst>
-            <pc:docMk/>
-            <pc:sldMk cId="3320114388" sldId="257"/>
-            <ac:picMk id="3" creationId="{0DFF8A4A-FFE8-960B-5D80-A8A9E25A82EB}"/>
-          </ac:picMkLst>
-        </pc:picChg>
-      </pc:sldChg>
-      <pc:sldChg chg="addSp delSp modSp new">
-        <pc:chgData name="Yashwanth Sai Vanukuru" userId="S::y_vanukuru@uncg.edu::a954039b-0d8c-423d-a820-0a09a0a7b36c" providerId="AD" clId="Web-{E13F7B84-C3C8-A2D5-A86A-58D1205AB694}" dt="2026-02-17T01:10:49.580" v="45" actId="1076"/>
-        <pc:sldMkLst>
-          <pc:docMk/>
-          <pc:sldMk cId="1939859564" sldId="258"/>
-        </pc:sldMkLst>
-        <pc:picChg chg="add del mod">
-          <ac:chgData name="Yashwanth Sai Vanukuru" userId="S::y_vanukuru@uncg.edu::a954039b-0d8c-423d-a820-0a09a0a7b36c" providerId="AD" clId="Web-{E13F7B84-C3C8-A2D5-A86A-58D1205AB694}" dt="2026-02-17T01:07:27.355" v="37"/>
-          <ac:picMkLst>
-            <pc:docMk/>
-            <pc:sldMk cId="1939859564" sldId="258"/>
-            <ac:picMk id="2" creationId="{1B16F7A5-D561-1FB2-56DD-C44EA5122795}"/>
-          </ac:picMkLst>
-        </pc:picChg>
-        <pc:picChg chg="add mod">
-          <ac:chgData name="Yashwanth Sai Vanukuru" userId="S::y_vanukuru@uncg.edu::a954039b-0d8c-423d-a820-0a09a0a7b36c" providerId="AD" clId="Web-{E13F7B84-C3C8-A2D5-A86A-58D1205AB694}" dt="2026-02-17T01:10:49.580" v="45" actId="1076"/>
-          <ac:picMkLst>
-            <pc:docMk/>
-            <pc:sldMk cId="1939859564" sldId="258"/>
-            <ac:picMk id="3" creationId="{C0B7C4C5-F902-638E-8707-0D5D29479F97}"/>
-          </ac:picMkLst>
-        </pc:picChg>
-      </pc:sldChg>
-      <pc:sldMasterChg chg="add del addSldLayout delSldLayout">
-        <pc:chgData name="Yashwanth Sai Vanukuru" userId="S::y_vanukuru@uncg.edu::a954039b-0d8c-423d-a820-0a09a0a7b36c" providerId="AD" clId="Web-{E13F7B84-C3C8-A2D5-A86A-58D1205AB694}" dt="2026-02-17T00:59:34.496" v="10"/>
-        <pc:sldMasterMkLst>
-          <pc:docMk/>
-          <pc:sldMasterMk cId="2460954070" sldId="2147483660"/>
-        </pc:sldMasterMkLst>
-        <pc:sldLayoutChg chg="add del">
-          <pc:chgData name="Yashwanth Sai Vanukuru" userId="S::y_vanukuru@uncg.edu::a954039b-0d8c-423d-a820-0a09a0a7b36c" providerId="AD" clId="Web-{E13F7B84-C3C8-A2D5-A86A-58D1205AB694}" dt="2026-02-17T00:59:34.496" v="10"/>
-          <pc:sldLayoutMkLst>
-            <pc:docMk/>
-            <pc:sldMasterMk cId="2460954070" sldId="2147483660"/>
-            <pc:sldLayoutMk cId="2385387890" sldId="2147483661"/>
-          </pc:sldLayoutMkLst>
-        </pc:sldLayoutChg>
-        <pc:sldLayoutChg chg="add del">
-          <pc:chgData name="Yashwanth Sai Vanukuru" userId="S::y_vanukuru@uncg.edu::a954039b-0d8c-423d-a820-0a09a0a7b36c" providerId="AD" clId="Web-{E13F7B84-C3C8-A2D5-A86A-58D1205AB694}" dt="2026-02-17T00:59:34.496" v="10"/>
-          <pc:sldLayoutMkLst>
-            <pc:docMk/>
-            <pc:sldMasterMk cId="2460954070" sldId="2147483660"/>
-            <pc:sldLayoutMk cId="949138452" sldId="2147483662"/>
-          </pc:sldLayoutMkLst>
-        </pc:sldLayoutChg>
-        <pc:sldLayoutChg chg="add del">
-          <pc:chgData name="Yashwanth Sai Vanukuru" userId="S::y_vanukuru@uncg.edu::a954039b-0d8c-423d-a820-0a09a0a7b36c" providerId="AD" clId="Web-{E13F7B84-C3C8-A2D5-A86A-58D1205AB694}" dt="2026-02-17T00:59:34.496" v="10"/>
-          <pc:sldLayoutMkLst>
-            <pc:docMk/>
-            <pc:sldMasterMk cId="2460954070" sldId="2147483660"/>
-            <pc:sldLayoutMk cId="2591524520" sldId="2147483663"/>
-          </pc:sldLayoutMkLst>
-        </pc:sldLayoutChg>
-        <pc:sldLayoutChg chg="add del">
-          <pc:chgData name="Yashwanth Sai Vanukuru" userId="S::y_vanukuru@uncg.edu::a954039b-0d8c-423d-a820-0a09a0a7b36c" providerId="AD" clId="Web-{E13F7B84-C3C8-A2D5-A86A-58D1205AB694}" dt="2026-02-17T00:59:34.496" v="10"/>
-          <pc:sldLayoutMkLst>
-            <pc:docMk/>
-            <pc:sldMasterMk cId="2460954070" sldId="2147483660"/>
-            <pc:sldLayoutMk cId="1203092039" sldId="2147483664"/>
-          </pc:sldLayoutMkLst>
-        </pc:sldLayoutChg>
-        <pc:sldLayoutChg chg="add del">
-          <pc:chgData name="Yashwanth Sai Vanukuru" userId="S::y_vanukuru@uncg.edu::a954039b-0d8c-423d-a820-0a09a0a7b36c" providerId="AD" clId="Web-{E13F7B84-C3C8-A2D5-A86A-58D1205AB694}" dt="2026-02-17T00:59:34.496" v="10"/>
-          <pc:sldLayoutMkLst>
-            <pc:docMk/>
-            <pc:sldMasterMk cId="2460954070" sldId="2147483660"/>
-            <pc:sldLayoutMk cId="3733172339" sldId="2147483665"/>
-          </pc:sldLayoutMkLst>
-        </pc:sldLayoutChg>
-        <pc:sldLayoutChg chg="add del">
-          <pc:chgData name="Yashwanth Sai Vanukuru" userId="S::y_vanukuru@uncg.edu::a954039b-0d8c-423d-a820-0a09a0a7b36c" providerId="AD" clId="Web-{E13F7B84-C3C8-A2D5-A86A-58D1205AB694}" dt="2026-02-17T00:59:34.496" v="10"/>
-          <pc:sldLayoutMkLst>
-            <pc:docMk/>
-            <pc:sldMasterMk cId="2460954070" sldId="2147483660"/>
-            <pc:sldLayoutMk cId="3210312558" sldId="2147483666"/>
-          </pc:sldLayoutMkLst>
-        </pc:sldLayoutChg>
-        <pc:sldLayoutChg chg="add del">
-          <pc:chgData name="Yashwanth Sai Vanukuru" userId="S::y_vanukuru@uncg.edu::a954039b-0d8c-423d-a820-0a09a0a7b36c" providerId="AD" clId="Web-{E13F7B84-C3C8-A2D5-A86A-58D1205AB694}" dt="2026-02-17T00:59:34.496" v="10"/>
-          <pc:sldLayoutMkLst>
-            <pc:docMk/>
-            <pc:sldMasterMk cId="2460954070" sldId="2147483660"/>
-            <pc:sldLayoutMk cId="3146388984" sldId="2147483667"/>
-          </pc:sldLayoutMkLst>
-        </pc:sldLayoutChg>
-        <pc:sldLayoutChg chg="add del">
-          <pc:chgData name="Yashwanth Sai Vanukuru" userId="S::y_vanukuru@uncg.edu::a954039b-0d8c-423d-a820-0a09a0a7b36c" providerId="AD" clId="Web-{E13F7B84-C3C8-A2D5-A86A-58D1205AB694}" dt="2026-02-17T00:59:34.496" v="10"/>
-          <pc:sldLayoutMkLst>
-            <pc:docMk/>
-            <pc:sldMasterMk cId="2460954070" sldId="2147483660"/>
-            <pc:sldLayoutMk cId="3171841454" sldId="2147483668"/>
-          </pc:sldLayoutMkLst>
-        </pc:sldLayoutChg>
-        <pc:sldLayoutChg chg="add del">
-          <pc:chgData name="Yashwanth Sai Vanukuru" userId="S::y_vanukuru@uncg.edu::a954039b-0d8c-423d-a820-0a09a0a7b36c" providerId="AD" clId="Web-{E13F7B84-C3C8-A2D5-A86A-58D1205AB694}" dt="2026-02-17T00:59:34.496" v="10"/>
-          <pc:sldLayoutMkLst>
-            <pc:docMk/>
-            <pc:sldMasterMk cId="2460954070" sldId="2147483660"/>
-            <pc:sldLayoutMk cId="1718958274" sldId="2147483669"/>
-          </pc:sldLayoutMkLst>
-        </pc:sldLayoutChg>
-        <pc:sldLayoutChg chg="add del">
-          <pc:chgData name="Yashwanth Sai Vanukuru" userId="S::y_vanukuru@uncg.edu::a954039b-0d8c-423d-a820-0a09a0a7b36c" providerId="AD" clId="Web-{E13F7B84-C3C8-A2D5-A86A-58D1205AB694}" dt="2026-02-17T00:59:34.496" v="10"/>
-          <pc:sldLayoutMkLst>
-            <pc:docMk/>
-            <pc:sldMasterMk cId="2460954070" sldId="2147483660"/>
-            <pc:sldLayoutMk cId="2202905451" sldId="2147483670"/>
-          </pc:sldLayoutMkLst>
-        </pc:sldLayoutChg>
-        <pc:sldLayoutChg chg="add del">
-          <pc:chgData name="Yashwanth Sai Vanukuru" userId="S::y_vanukuru@uncg.edu::a954039b-0d8c-423d-a820-0a09a0a7b36c" providerId="AD" clId="Web-{E13F7B84-C3C8-A2D5-A86A-58D1205AB694}" dt="2026-02-17T00:59:34.496" v="10"/>
-          <pc:sldLayoutMkLst>
-            <pc:docMk/>
-            <pc:sldMasterMk cId="2460954070" sldId="2147483660"/>
-            <pc:sldLayoutMk cId="3479445657" sldId="2147483671"/>
-          </pc:sldLayoutMkLst>
-        </pc:sldLayoutChg>
-      </pc:sldMasterChg>
-      <pc:sldMasterChg chg="add del addSldLayout delSldLayout">
-        <pc:chgData name="Yashwanth Sai Vanukuru" userId="S::y_vanukuru@uncg.edu::a954039b-0d8c-423d-a820-0a09a0a7b36c" providerId="AD" clId="Web-{E13F7B84-C3C8-A2D5-A86A-58D1205AB694}" dt="2026-02-17T00:59:29.230" v="7"/>
-        <pc:sldMasterMkLst>
-          <pc:docMk/>
-          <pc:sldMasterMk cId="3072690691" sldId="2147483672"/>
-        </pc:sldMasterMkLst>
-        <pc:sldLayoutChg chg="add del">
-          <pc:chgData name="Yashwanth Sai Vanukuru" userId="S::y_vanukuru@uncg.edu::a954039b-0d8c-423d-a820-0a09a0a7b36c" providerId="AD" clId="Web-{E13F7B84-C3C8-A2D5-A86A-58D1205AB694}" dt="2026-02-17T00:59:29.230" v="7"/>
-          <pc:sldLayoutMkLst>
-            <pc:docMk/>
-            <pc:sldMasterMk cId="3072690691" sldId="2147483672"/>
-            <pc:sldLayoutMk cId="408195238" sldId="2147483673"/>
-          </pc:sldLayoutMkLst>
-        </pc:sldLayoutChg>
-        <pc:sldLayoutChg chg="add del">
-          <pc:chgData name="Yashwanth Sai Vanukuru" userId="S::y_vanukuru@uncg.edu::a954039b-0d8c-423d-a820-0a09a0a7b36c" providerId="AD" clId="Web-{E13F7B84-C3C8-A2D5-A86A-58D1205AB694}" dt="2026-02-17T00:59:29.230" v="7"/>
-          <pc:sldLayoutMkLst>
-            <pc:docMk/>
-            <pc:sldMasterMk cId="3072690691" sldId="2147483672"/>
-            <pc:sldLayoutMk cId="1384985887" sldId="2147483674"/>
-          </pc:sldLayoutMkLst>
-        </pc:sldLayoutChg>
-        <pc:sldLayoutChg chg="add del">
-          <pc:chgData name="Yashwanth Sai Vanukuru" userId="S::y_vanukuru@uncg.edu::a954039b-0d8c-423d-a820-0a09a0a7b36c" providerId="AD" clId="Web-{E13F7B84-C3C8-A2D5-A86A-58D1205AB694}" dt="2026-02-17T00:59:29.230" v="7"/>
-          <pc:sldLayoutMkLst>
-            <pc:docMk/>
-            <pc:sldMasterMk cId="3072690691" sldId="2147483672"/>
-            <pc:sldLayoutMk cId="2904810085" sldId="2147483675"/>
-          </pc:sldLayoutMkLst>
-        </pc:sldLayoutChg>
-        <pc:sldLayoutChg chg="add del">
-          <pc:chgData name="Yashwanth Sai Vanukuru" userId="S::y_vanukuru@uncg.edu::a954039b-0d8c-423d-a820-0a09a0a7b36c" providerId="AD" clId="Web-{E13F7B84-C3C8-A2D5-A86A-58D1205AB694}" dt="2026-02-17T00:59:29.230" v="7"/>
-          <pc:sldLayoutMkLst>
-            <pc:docMk/>
-            <pc:sldMasterMk cId="3072690691" sldId="2147483672"/>
-            <pc:sldLayoutMk cId="3804510035" sldId="2147483676"/>
-          </pc:sldLayoutMkLst>
-        </pc:sldLayoutChg>
-        <pc:sldLayoutChg chg="add del">
-          <pc:chgData name="Yashwanth Sai Vanukuru" userId="S::y_vanukuru@uncg.edu::a954039b-0d8c-423d-a820-0a09a0a7b36c" providerId="AD" clId="Web-{E13F7B84-C3C8-A2D5-A86A-58D1205AB694}" dt="2026-02-17T00:59:29.230" v="7"/>
-          <pc:sldLayoutMkLst>
-            <pc:docMk/>
-            <pc:sldMasterMk cId="3072690691" sldId="2147483672"/>
-            <pc:sldLayoutMk cId="2725525772" sldId="2147483677"/>
-          </pc:sldLayoutMkLst>
-        </pc:sldLayoutChg>
-        <pc:sldLayoutChg chg="add del">
-          <pc:chgData name="Yashwanth Sai Vanukuru" userId="S::y_vanukuru@uncg.edu::a954039b-0d8c-423d-a820-0a09a0a7b36c" providerId="AD" clId="Web-{E13F7B84-C3C8-A2D5-A86A-58D1205AB694}" dt="2026-02-17T00:59:29.230" v="7"/>
-          <pc:sldLayoutMkLst>
-            <pc:docMk/>
-            <pc:sldMasterMk cId="3072690691" sldId="2147483672"/>
-            <pc:sldLayoutMk cId="2307597344" sldId="2147483678"/>
-          </pc:sldLayoutMkLst>
-        </pc:sldLayoutChg>
-        <pc:sldLayoutChg chg="add del">
-          <pc:chgData name="Yashwanth Sai Vanukuru" userId="S::y_vanukuru@uncg.edu::a954039b-0d8c-423d-a820-0a09a0a7b36c" providerId="AD" clId="Web-{E13F7B84-C3C8-A2D5-A86A-58D1205AB694}" dt="2026-02-17T00:59:29.230" v="7"/>
-          <pc:sldLayoutMkLst>
-            <pc:docMk/>
-            <pc:sldMasterMk cId="3072690691" sldId="2147483672"/>
-            <pc:sldLayoutMk cId="2593023224" sldId="2147483679"/>
-          </pc:sldLayoutMkLst>
-        </pc:sldLayoutChg>
-        <pc:sldLayoutChg chg="add del">
-          <pc:chgData name="Yashwanth Sai Vanukuru" userId="S::y_vanukuru@uncg.edu::a954039b-0d8c-423d-a820-0a09a0a7b36c" providerId="AD" clId="Web-{E13F7B84-C3C8-A2D5-A86A-58D1205AB694}" dt="2026-02-17T00:59:29.230" v="7"/>
-          <pc:sldLayoutMkLst>
-            <pc:docMk/>
-            <pc:sldMasterMk cId="3072690691" sldId="2147483672"/>
-            <pc:sldLayoutMk cId="3749662711" sldId="2147483680"/>
-          </pc:sldLayoutMkLst>
-        </pc:sldLayoutChg>
-        <pc:sldLayoutChg chg="add del">
-          <pc:chgData name="Yashwanth Sai Vanukuru" userId="S::y_vanukuru@uncg.edu::a954039b-0d8c-423d-a820-0a09a0a7b36c" providerId="AD" clId="Web-{E13F7B84-C3C8-A2D5-A86A-58D1205AB694}" dt="2026-02-17T00:59:29.230" v="7"/>
-          <pc:sldLayoutMkLst>
-            <pc:docMk/>
-            <pc:sldMasterMk cId="3072690691" sldId="2147483672"/>
-            <pc:sldLayoutMk cId="3954908708" sldId="2147483681"/>
-          </pc:sldLayoutMkLst>
-        </pc:sldLayoutChg>
-        <pc:sldLayoutChg chg="add del">
-          <pc:chgData name="Yashwanth Sai Vanukuru" userId="S::y_vanukuru@uncg.edu::a954039b-0d8c-423d-a820-0a09a0a7b36c" providerId="AD" clId="Web-{E13F7B84-C3C8-A2D5-A86A-58D1205AB694}" dt="2026-02-17T00:59:29.230" v="7"/>
-          <pc:sldLayoutMkLst>
-            <pc:docMk/>
-            <pc:sldMasterMk cId="3072690691" sldId="2147483672"/>
-            <pc:sldLayoutMk cId="3045080091" sldId="2147483682"/>
-          </pc:sldLayoutMkLst>
-        </pc:sldLayoutChg>
-        <pc:sldLayoutChg chg="add del">
-          <pc:chgData name="Yashwanth Sai Vanukuru" userId="S::y_vanukuru@uncg.edu::a954039b-0d8c-423d-a820-0a09a0a7b36c" providerId="AD" clId="Web-{E13F7B84-C3C8-A2D5-A86A-58D1205AB694}" dt="2026-02-17T00:59:29.230" v="7"/>
-          <pc:sldLayoutMkLst>
-            <pc:docMk/>
-            <pc:sldMasterMk cId="3072690691" sldId="2147483672"/>
-            <pc:sldLayoutMk cId="2525442328" sldId="2147483683"/>
-          </pc:sldLayoutMkLst>
-        </pc:sldLayoutChg>
-      </pc:sldMasterChg>
-      <pc:sldMasterChg chg="add del addSldLayout delSldLayout">
-        <pc:chgData name="Yashwanth Sai Vanukuru" userId="S::y_vanukuru@uncg.edu::a954039b-0d8c-423d-a820-0a09a0a7b36c" providerId="AD" clId="Web-{E13F7B84-C3C8-A2D5-A86A-58D1205AB694}" dt="2026-02-17T00:59:34.449" v="9"/>
-        <pc:sldMasterMkLst>
-          <pc:docMk/>
-          <pc:sldMasterMk cId="2292925631" sldId="2147483695"/>
-        </pc:sldMasterMkLst>
-        <pc:sldLayoutChg chg="add del">
-          <pc:chgData name="Yashwanth Sai Vanukuru" userId="S::y_vanukuru@uncg.edu::a954039b-0d8c-423d-a820-0a09a0a7b36c" providerId="AD" clId="Web-{E13F7B84-C3C8-A2D5-A86A-58D1205AB694}" dt="2026-02-17T00:59:34.449" v="9"/>
-          <pc:sldLayoutMkLst>
-            <pc:docMk/>
-            <pc:sldMasterMk cId="2292925631" sldId="2147483695"/>
-            <pc:sldLayoutMk cId="2721064169" sldId="2147483684"/>
-          </pc:sldLayoutMkLst>
-        </pc:sldLayoutChg>
-        <pc:sldLayoutChg chg="add del">
-          <pc:chgData name="Yashwanth Sai Vanukuru" userId="S::y_vanukuru@uncg.edu::a954039b-0d8c-423d-a820-0a09a0a7b36c" providerId="AD" clId="Web-{E13F7B84-C3C8-A2D5-A86A-58D1205AB694}" dt="2026-02-17T00:59:34.449" v="9"/>
-          <pc:sldLayoutMkLst>
-            <pc:docMk/>
-            <pc:sldMasterMk cId="2292925631" sldId="2147483695"/>
-            <pc:sldLayoutMk cId="3036789016" sldId="2147483685"/>
-          </pc:sldLayoutMkLst>
-        </pc:sldLayoutChg>
-        <pc:sldLayoutChg chg="add del">
-          <pc:chgData name="Yashwanth Sai Vanukuru" userId="S::y_vanukuru@uncg.edu::a954039b-0d8c-423d-a820-0a09a0a7b36c" providerId="AD" clId="Web-{E13F7B84-C3C8-A2D5-A86A-58D1205AB694}" dt="2026-02-17T00:59:34.449" v="9"/>
-          <pc:sldLayoutMkLst>
-            <pc:docMk/>
-            <pc:sldMasterMk cId="2292925631" sldId="2147483695"/>
-            <pc:sldLayoutMk cId="101739205" sldId="2147483686"/>
-          </pc:sldLayoutMkLst>
-        </pc:sldLayoutChg>
-        <pc:sldLayoutChg chg="add del">
-          <pc:chgData name="Yashwanth Sai Vanukuru" userId="S::y_vanukuru@uncg.edu::a954039b-0d8c-423d-a820-0a09a0a7b36c" providerId="AD" clId="Web-{E13F7B84-C3C8-A2D5-A86A-58D1205AB694}" dt="2026-02-17T00:59:34.449" v="9"/>
-          <pc:sldLayoutMkLst>
-            <pc:docMk/>
-            <pc:sldMasterMk cId="2292925631" sldId="2147483695"/>
-            <pc:sldLayoutMk cId="732479021" sldId="2147483687"/>
-          </pc:sldLayoutMkLst>
-        </pc:sldLayoutChg>
-        <pc:sldLayoutChg chg="add del">
-          <pc:chgData name="Yashwanth Sai Vanukuru" userId="S::y_vanukuru@uncg.edu::a954039b-0d8c-423d-a820-0a09a0a7b36c" providerId="AD" clId="Web-{E13F7B84-C3C8-A2D5-A86A-58D1205AB694}" dt="2026-02-17T00:59:34.449" v="9"/>
-          <pc:sldLayoutMkLst>
-            <pc:docMk/>
-            <pc:sldMasterMk cId="2292925631" sldId="2147483695"/>
-            <pc:sldLayoutMk cId="4001719779" sldId="2147483688"/>
-          </pc:sldLayoutMkLst>
-        </pc:sldLayoutChg>
-        <pc:sldLayoutChg chg="add del">
-          <pc:chgData name="Yashwanth Sai Vanukuru" userId="S::y_vanukuru@uncg.edu::a954039b-0d8c-423d-a820-0a09a0a7b36c" providerId="AD" clId="Web-{E13F7B84-C3C8-A2D5-A86A-58D1205AB694}" dt="2026-02-17T00:59:34.449" v="9"/>
-          <pc:sldLayoutMkLst>
-            <pc:docMk/>
-            <pc:sldMasterMk cId="2292925631" sldId="2147483695"/>
-            <pc:sldLayoutMk cId="3507289580" sldId="2147483689"/>
-          </pc:sldLayoutMkLst>
-        </pc:sldLayoutChg>
-        <pc:sldLayoutChg chg="add del">
-          <pc:chgData name="Yashwanth Sai Vanukuru" userId="S::y_vanukuru@uncg.edu::a954039b-0d8c-423d-a820-0a09a0a7b36c" providerId="AD" clId="Web-{E13F7B84-C3C8-A2D5-A86A-58D1205AB694}" dt="2026-02-17T00:59:34.449" v="9"/>
-          <pc:sldLayoutMkLst>
-            <pc:docMk/>
-            <pc:sldMasterMk cId="2292925631" sldId="2147483695"/>
-            <pc:sldLayoutMk cId="2515995063" sldId="2147483690"/>
-          </pc:sldLayoutMkLst>
-        </pc:sldLayoutChg>
-        <pc:sldLayoutChg chg="add del">
-          <pc:chgData name="Yashwanth Sai Vanukuru" userId="S::y_vanukuru@uncg.edu::a954039b-0d8c-423d-a820-0a09a0a7b36c" providerId="AD" clId="Web-{E13F7B84-C3C8-A2D5-A86A-58D1205AB694}" dt="2026-02-17T00:59:34.449" v="9"/>
-          <pc:sldLayoutMkLst>
-            <pc:docMk/>
-            <pc:sldMasterMk cId="2292925631" sldId="2147483695"/>
-            <pc:sldLayoutMk cId="1015044391" sldId="2147483691"/>
-          </pc:sldLayoutMkLst>
-        </pc:sldLayoutChg>
-        <pc:sldLayoutChg chg="add del">
-          <pc:chgData name="Yashwanth Sai Vanukuru" userId="S::y_vanukuru@uncg.edu::a954039b-0d8c-423d-a820-0a09a0a7b36c" providerId="AD" clId="Web-{E13F7B84-C3C8-A2D5-A86A-58D1205AB694}" dt="2026-02-17T00:59:34.449" v="9"/>
-          <pc:sldLayoutMkLst>
-            <pc:docMk/>
-            <pc:sldMasterMk cId="2292925631" sldId="2147483695"/>
-            <pc:sldLayoutMk cId="2574983899" sldId="2147483692"/>
-          </pc:sldLayoutMkLst>
-        </pc:sldLayoutChg>
-        <pc:sldLayoutChg chg="add del">
-          <pc:chgData name="Yashwanth Sai Vanukuru" userId="S::y_vanukuru@uncg.edu::a954039b-0d8c-423d-a820-0a09a0a7b36c" providerId="AD" clId="Web-{E13F7B84-C3C8-A2D5-A86A-58D1205AB694}" dt="2026-02-17T00:59:34.449" v="9"/>
-          <pc:sldLayoutMkLst>
-            <pc:docMk/>
-            <pc:sldMasterMk cId="2292925631" sldId="2147483695"/>
-            <pc:sldLayoutMk cId="3176743795" sldId="2147483693"/>
-          </pc:sldLayoutMkLst>
-        </pc:sldLayoutChg>
-        <pc:sldLayoutChg chg="add del">
-          <pc:chgData name="Yashwanth Sai Vanukuru" userId="S::y_vanukuru@uncg.edu::a954039b-0d8c-423d-a820-0a09a0a7b36c" providerId="AD" clId="Web-{E13F7B84-C3C8-A2D5-A86A-58D1205AB694}" dt="2026-02-17T00:59:34.449" v="9"/>
-          <pc:sldLayoutMkLst>
-            <pc:docMk/>
-            <pc:sldMasterMk cId="2292925631" sldId="2147483695"/>
-            <pc:sldLayoutMk cId="3750687019" sldId="2147483694"/>
-          </pc:sldLayoutMkLst>
-        </pc:sldLayoutChg>
-      </pc:sldMasterChg>
-      <pc:sldMasterChg chg="add addSldLayout">
-        <pc:chgData name="Yashwanth Sai Vanukuru" userId="S::y_vanukuru@uncg.edu::a954039b-0d8c-423d-a820-0a09a0a7b36c" providerId="AD" clId="Web-{E13F7B84-C3C8-A2D5-A86A-58D1205AB694}" dt="2026-02-17T00:59:34.496" v="10"/>
-        <pc:sldMasterMkLst>
-          <pc:docMk/>
-          <pc:sldMasterMk cId="1333622939" sldId="2147483721"/>
-        </pc:sldMasterMkLst>
-        <pc:sldLayoutChg chg="add">
-          <pc:chgData name="Yashwanth Sai Vanukuru" userId="S::y_vanukuru@uncg.edu::a954039b-0d8c-423d-a820-0a09a0a7b36c" providerId="AD" clId="Web-{E13F7B84-C3C8-A2D5-A86A-58D1205AB694}" dt="2026-02-17T00:59:34.496" v="10"/>
-          <pc:sldLayoutMkLst>
-            <pc:docMk/>
-            <pc:sldMasterMk cId="1333622939" sldId="2147483721"/>
-            <pc:sldLayoutMk cId="4122336863" sldId="2147483710"/>
-          </pc:sldLayoutMkLst>
-        </pc:sldLayoutChg>
-        <pc:sldLayoutChg chg="add">
-          <pc:chgData name="Yashwanth Sai Vanukuru" userId="S::y_vanukuru@uncg.edu::a954039b-0d8c-423d-a820-0a09a0a7b36c" providerId="AD" clId="Web-{E13F7B84-C3C8-A2D5-A86A-58D1205AB694}" dt="2026-02-17T00:59:34.496" v="10"/>
-          <pc:sldLayoutMkLst>
-            <pc:docMk/>
-            <pc:sldMasterMk cId="1333622939" sldId="2147483721"/>
-            <pc:sldLayoutMk cId="2123987263" sldId="2147483711"/>
-          </pc:sldLayoutMkLst>
-        </pc:sldLayoutChg>
-        <pc:sldLayoutChg chg="add">
-          <pc:chgData name="Yashwanth Sai Vanukuru" userId="S::y_vanukuru@uncg.edu::a954039b-0d8c-423d-a820-0a09a0a7b36c" providerId="AD" clId="Web-{E13F7B84-C3C8-A2D5-A86A-58D1205AB694}" dt="2026-02-17T00:59:34.496" v="10"/>
-          <pc:sldLayoutMkLst>
-            <pc:docMk/>
-            <pc:sldMasterMk cId="1333622939" sldId="2147483721"/>
-            <pc:sldLayoutMk cId="4006722874" sldId="2147483712"/>
-          </pc:sldLayoutMkLst>
-        </pc:sldLayoutChg>
-        <pc:sldLayoutChg chg="add">
-          <pc:chgData name="Yashwanth Sai Vanukuru" userId="S::y_vanukuru@uncg.edu::a954039b-0d8c-423d-a820-0a09a0a7b36c" providerId="AD" clId="Web-{E13F7B84-C3C8-A2D5-A86A-58D1205AB694}" dt="2026-02-17T00:59:34.496" v="10"/>
-          <pc:sldLayoutMkLst>
-            <pc:docMk/>
-            <pc:sldMasterMk cId="1333622939" sldId="2147483721"/>
-            <pc:sldLayoutMk cId="3804107480" sldId="2147483713"/>
-          </pc:sldLayoutMkLst>
-        </pc:sldLayoutChg>
-        <pc:sldLayoutChg chg="add">
-          <pc:chgData name="Yashwanth Sai Vanukuru" userId="S::y_vanukuru@uncg.edu::a954039b-0d8c-423d-a820-0a09a0a7b36c" providerId="AD" clId="Web-{E13F7B84-C3C8-A2D5-A86A-58D1205AB694}" dt="2026-02-17T00:59:34.496" v="10"/>
-          <pc:sldLayoutMkLst>
-            <pc:docMk/>
-            <pc:sldMasterMk cId="1333622939" sldId="2147483721"/>
-            <pc:sldLayoutMk cId="3717121088" sldId="2147483714"/>
-          </pc:sldLayoutMkLst>
-        </pc:sldLayoutChg>
-        <pc:sldLayoutChg chg="add">
-          <pc:chgData name="Yashwanth Sai Vanukuru" userId="S::y_vanukuru@uncg.edu::a954039b-0d8c-423d-a820-0a09a0a7b36c" providerId="AD" clId="Web-{E13F7B84-C3C8-A2D5-A86A-58D1205AB694}" dt="2026-02-17T00:59:34.496" v="10"/>
-          <pc:sldLayoutMkLst>
-            <pc:docMk/>
-            <pc:sldMasterMk cId="1333622939" sldId="2147483721"/>
-            <pc:sldLayoutMk cId="1031663675" sldId="2147483715"/>
-          </pc:sldLayoutMkLst>
-        </pc:sldLayoutChg>
-        <pc:sldLayoutChg chg="add">
-          <pc:chgData name="Yashwanth Sai Vanukuru" userId="S::y_vanukuru@uncg.edu::a954039b-0d8c-423d-a820-0a09a0a7b36c" providerId="AD" clId="Web-{E13F7B84-C3C8-A2D5-A86A-58D1205AB694}" dt="2026-02-17T00:59:34.496" v="10"/>
-          <pc:sldLayoutMkLst>
-            <pc:docMk/>
-            <pc:sldMasterMk cId="1333622939" sldId="2147483721"/>
-            <pc:sldLayoutMk cId="3984449405" sldId="2147483716"/>
-          </pc:sldLayoutMkLst>
-        </pc:sldLayoutChg>
-        <pc:sldLayoutChg chg="add">
-          <pc:chgData name="Yashwanth Sai Vanukuru" userId="S::y_vanukuru@uncg.edu::a954039b-0d8c-423d-a820-0a09a0a7b36c" providerId="AD" clId="Web-{E13F7B84-C3C8-A2D5-A86A-58D1205AB694}" dt="2026-02-17T00:59:34.496" v="10"/>
-          <pc:sldLayoutMkLst>
-            <pc:docMk/>
-            <pc:sldMasterMk cId="1333622939" sldId="2147483721"/>
-            <pc:sldLayoutMk cId="1799540671" sldId="2147483717"/>
-          </pc:sldLayoutMkLst>
-        </pc:sldLayoutChg>
-        <pc:sldLayoutChg chg="add">
-          <pc:chgData name="Yashwanth Sai Vanukuru" userId="S::y_vanukuru@uncg.edu::a954039b-0d8c-423d-a820-0a09a0a7b36c" providerId="AD" clId="Web-{E13F7B84-C3C8-A2D5-A86A-58D1205AB694}" dt="2026-02-17T00:59:34.496" v="10"/>
-          <pc:sldLayoutMkLst>
-            <pc:docMk/>
-            <pc:sldMasterMk cId="1333622939" sldId="2147483721"/>
-            <pc:sldLayoutMk cId="1444616203" sldId="2147483718"/>
-          </pc:sldLayoutMkLst>
-        </pc:sldLayoutChg>
-        <pc:sldLayoutChg chg="add">
-          <pc:chgData name="Yashwanth Sai Vanukuru" userId="S::y_vanukuru@uncg.edu::a954039b-0d8c-423d-a820-0a09a0a7b36c" providerId="AD" clId="Web-{E13F7B84-C3C8-A2D5-A86A-58D1205AB694}" dt="2026-02-17T00:59:34.496" v="10"/>
-          <pc:sldLayoutMkLst>
-            <pc:docMk/>
-            <pc:sldMasterMk cId="1333622939" sldId="2147483721"/>
-            <pc:sldLayoutMk cId="3084377942" sldId="2147483719"/>
-          </pc:sldLayoutMkLst>
-        </pc:sldLayoutChg>
-        <pc:sldLayoutChg chg="add">
-          <pc:chgData name="Yashwanth Sai Vanukuru" userId="S::y_vanukuru@uncg.edu::a954039b-0d8c-423d-a820-0a09a0a7b36c" providerId="AD" clId="Web-{E13F7B84-C3C8-A2D5-A86A-58D1205AB694}" dt="2026-02-17T00:59:34.496" v="10"/>
-          <pc:sldLayoutMkLst>
-            <pc:docMk/>
-            <pc:sldMasterMk cId="1333622939" sldId="2147483721"/>
-            <pc:sldLayoutMk cId="2269715007" sldId="2147483720"/>
-          </pc:sldLayoutMkLst>
-        </pc:sldLayoutChg>
-      </pc:sldMasterChg>
-    </pc:docChg>
-  </pc:docChgLst>
-</pc:chgInfo>
+<file path=ppt/notesSlides/notesSlide1.xml><?xml version="1.0" encoding="utf-8"?>
+<p:notes xmlns:a="http://schemas.openxmlformats.org/drawingml/2006/main" xmlns:r="http://schemas.openxmlformats.org/officeDocument/2006/relationships" xmlns:p="http://schemas.openxmlformats.org/presentationml/2006/main">
+  <p:cSld>
+    <p:spTree>
+      <p:nvGrpSpPr>
+        <p:cNvPr id="1" name=""/>
+        <p:cNvGrpSpPr/>
+        <p:nvPr/>
+      </p:nvGrpSpPr>
+      <p:grpSpPr/>
+      <p:sp>
+        <p:nvSpPr>
+          <p:cNvPr id="2" name="Slide Image Placeholder 1"/>
+          <p:cNvSpPr>
+            <a:spLocks noGrp="1"/>
+          </p:cNvSpPr>
+          <p:nvPr>
+            <p:ph type="sldImg" idx="2"/>
+          </p:nvPr>
+        </p:nvSpPr>
+        <p:spPr/>
+      </p:sp>
+      <p:sp>
+        <p:nvSpPr>
+          <p:cNvPr id="3" name="Text Placeholder 2"/>
+          <p:cNvSpPr>
+            <a:spLocks noGrp="1"/>
+          </p:cNvSpPr>
+          <p:nvPr>
+            <p:ph type="body" idx="3"/>
+          </p:nvPr>
+        </p:nvSpPr>
+        <p:spPr/>
+        <p:txBody>
+          <a:bodyPr/>
+          <a:p>
+            <a:endParaRPr lang="en-US"/>
+          </a:p>
+        </p:txBody>
+      </p:sp>
+    </p:spTree>
+  </p:cSld>
+  <p:clrMapOvr>
+    <a:masterClrMapping/>
+  </p:clrMapOvr>
+</p:notes>
 </file>
 
 <file path=ppt/slideLayouts/slideLayout1.xml><?xml version="1.0" encoding="utf-8"?>
@@ -681,13 +526,7 @@
       </p:grpSpPr>
       <p:sp>
         <p:nvSpPr>
-          <p:cNvPr id="2" name="Title 1">
-            <a:extLst>
-              <a:ext uri="{FF2B5EF4-FFF2-40B4-BE49-F238E27FC236}">
-                <a16:creationId xmlns:a16="http://schemas.microsoft.com/office/drawing/2014/main" id="{E4336E9A-8E96-CD8C-7598-F87632CD81CF}"/>
-              </a:ext>
-            </a:extLst>
-          </p:cNvPr>
+          <p:cNvPr id="2" name="Title 1"/>
           <p:cNvSpPr>
             <a:spLocks noGrp="1"/>
           </p:cNvSpPr>
@@ -721,13 +560,7 @@
       </p:sp>
       <p:sp>
         <p:nvSpPr>
-          <p:cNvPr id="3" name="Subtitle 2">
-            <a:extLst>
-              <a:ext uri="{FF2B5EF4-FFF2-40B4-BE49-F238E27FC236}">
-                <a16:creationId xmlns:a16="http://schemas.microsoft.com/office/drawing/2014/main" id="{2BDC76B8-60F6-62D3-9F73-E81662203017}"/>
-              </a:ext>
-            </a:extLst>
-          </p:cNvPr>
+          <p:cNvPr id="3" name="Subtitle 2"/>
           <p:cNvSpPr>
             <a:spLocks noGrp="1"/>
           </p:cNvSpPr>
@@ -794,13 +627,7 @@
       </p:sp>
       <p:sp>
         <p:nvSpPr>
-          <p:cNvPr id="4" name="Date Placeholder 3">
-            <a:extLst>
-              <a:ext uri="{FF2B5EF4-FFF2-40B4-BE49-F238E27FC236}">
-                <a16:creationId xmlns:a16="http://schemas.microsoft.com/office/drawing/2014/main" id="{EAE2DAFA-435E-AAF9-8B67-495E5AFDCD91}"/>
-              </a:ext>
-            </a:extLst>
-          </p:cNvPr>
+          <p:cNvPr id="4" name="Date Placeholder 3"/>
           <p:cNvSpPr>
             <a:spLocks noGrp="1"/>
           </p:cNvSpPr>
@@ -815,7 +642,6 @@
           <a:p>
             <a:fld id="{C128FA71-3A18-48C0-980F-4B68F7F63042}" type="datetime1">
               <a:rPr lang="en-US" smtClean="0"/>
-              <a:t>2/16/2026</a:t>
             </a:fld>
             <a:endParaRPr lang="en-US"/>
           </a:p>
@@ -823,13 +649,7 @@
       </p:sp>
       <p:sp>
         <p:nvSpPr>
-          <p:cNvPr id="5" name="Footer Placeholder 4">
-            <a:extLst>
-              <a:ext uri="{FF2B5EF4-FFF2-40B4-BE49-F238E27FC236}">
-                <a16:creationId xmlns:a16="http://schemas.microsoft.com/office/drawing/2014/main" id="{5B407A58-3351-E479-1A0C-2FF49FA42707}"/>
-              </a:ext>
-            </a:extLst>
-          </p:cNvPr>
+          <p:cNvPr id="5" name="Footer Placeholder 4"/>
           <p:cNvSpPr>
             <a:spLocks noGrp="1"/>
           </p:cNvSpPr>
@@ -848,13 +668,7 @@
       </p:sp>
       <p:sp>
         <p:nvSpPr>
-          <p:cNvPr id="6" name="Slide Number Placeholder 5">
-            <a:extLst>
-              <a:ext uri="{FF2B5EF4-FFF2-40B4-BE49-F238E27FC236}">
-                <a16:creationId xmlns:a16="http://schemas.microsoft.com/office/drawing/2014/main" id="{81789E10-2433-2ECB-9C92-571B583A4CF1}"/>
-              </a:ext>
-            </a:extLst>
-          </p:cNvPr>
+          <p:cNvPr id="6" name="Slide Number Placeholder 5"/>
           <p:cNvSpPr>
             <a:spLocks noGrp="1"/>
           </p:cNvSpPr>
@@ -869,18 +683,12 @@
           <a:p>
             <a:fld id="{CC057153-B650-4DEB-B370-79DDCFDCE934}" type="slidenum">
               <a:rPr lang="en-US" smtClean="0"/>
-              <a:t>‹#›</a:t>
             </a:fld>
             <a:endParaRPr lang="en-US"/>
           </a:p>
         </p:txBody>
       </p:sp>
     </p:spTree>
-    <p:extLst>
-      <p:ext uri="{BB962C8B-B14F-4D97-AF65-F5344CB8AC3E}">
-        <p14:creationId xmlns:p14="http://schemas.microsoft.com/office/powerpoint/2010/main" val="3984449405"/>
-      </p:ext>
-    </p:extLst>
   </p:cSld>
   <p:clrMapOvr>
     <a:masterClrMapping/>
@@ -907,13 +715,7 @@
       </p:grpSpPr>
       <p:sp>
         <p:nvSpPr>
-          <p:cNvPr id="2" name="Title 1">
-            <a:extLst>
-              <a:ext uri="{FF2B5EF4-FFF2-40B4-BE49-F238E27FC236}">
-                <a16:creationId xmlns:a16="http://schemas.microsoft.com/office/drawing/2014/main" id="{354E956D-CB73-C986-F100-46487310D11E}"/>
-              </a:ext>
-            </a:extLst>
-          </p:cNvPr>
+          <p:cNvPr id="2" name="Title 1"/>
           <p:cNvSpPr>
             <a:spLocks noGrp="1"/>
           </p:cNvSpPr>
@@ -935,18 +737,13 @@
               <a:rPr lang="en-US"/>
               <a:t>Click to edit Master title style</a:t>
             </a:r>
-          </a:p>
-        </p:txBody>
-      </p:sp>
-      <p:sp>
-        <p:nvSpPr>
-          <p:cNvPr id="3" name="Vertical Text Placeholder 2">
-            <a:extLst>
-              <a:ext uri="{FF2B5EF4-FFF2-40B4-BE49-F238E27FC236}">
-                <a16:creationId xmlns:a16="http://schemas.microsoft.com/office/drawing/2014/main" id="{FE423E6A-A07C-BF0D-EA30-9A8A854E48F1}"/>
-              </a:ext>
-            </a:extLst>
-          </p:cNvPr>
+            <a:endParaRPr lang="en-US"/>
+          </a:p>
+        </p:txBody>
+      </p:sp>
+      <p:sp>
+        <p:nvSpPr>
+          <p:cNvPr id="3" name="Vertical Text Placeholder 2"/>
           <p:cNvSpPr>
             <a:spLocks noGrp="1"/>
           </p:cNvSpPr>
@@ -969,6 +766,7 @@
               <a:rPr lang="en-US"/>
               <a:t>Click to edit Master text styles</a:t>
             </a:r>
+            <a:endParaRPr lang="en-US"/>
           </a:p>
           <a:p>
             <a:pPr lvl="1"/>
@@ -976,6 +774,7 @@
               <a:rPr lang="en-US"/>
               <a:t>Second level</a:t>
             </a:r>
+            <a:endParaRPr lang="en-US"/>
           </a:p>
           <a:p>
             <a:pPr lvl="2"/>
@@ -983,6 +782,7 @@
               <a:rPr lang="en-US"/>
               <a:t>Third level</a:t>
             </a:r>
+            <a:endParaRPr lang="en-US"/>
           </a:p>
           <a:p>
             <a:pPr lvl="3"/>
@@ -990,6 +790,7 @@
               <a:rPr lang="en-US"/>
               <a:t>Fourth level</a:t>
             </a:r>
+            <a:endParaRPr lang="en-US"/>
           </a:p>
           <a:p>
             <a:pPr lvl="4"/>
@@ -997,18 +798,13 @@
               <a:rPr lang="en-US"/>
               <a:t>Fifth level</a:t>
             </a:r>
-          </a:p>
-        </p:txBody>
-      </p:sp>
-      <p:sp>
-        <p:nvSpPr>
-          <p:cNvPr id="4" name="Date Placeholder 3">
-            <a:extLst>
-              <a:ext uri="{FF2B5EF4-FFF2-40B4-BE49-F238E27FC236}">
-                <a16:creationId xmlns:a16="http://schemas.microsoft.com/office/drawing/2014/main" id="{EEDC9908-8F95-8DFC-72CC-158552B56735}"/>
-              </a:ext>
-            </a:extLst>
-          </p:cNvPr>
+            <a:endParaRPr lang="en-US"/>
+          </a:p>
+        </p:txBody>
+      </p:sp>
+      <p:sp>
+        <p:nvSpPr>
+          <p:cNvPr id="4" name="Date Placeholder 3"/>
           <p:cNvSpPr>
             <a:spLocks noGrp="1"/>
           </p:cNvSpPr>
@@ -1023,7 +819,6 @@
           <a:p>
             <a:fld id="{7104EDB3-C0E8-45F8-9E1D-1B6C8D1880C0}" type="datetime1">
               <a:rPr lang="en-US" smtClean="0"/>
-              <a:t>2/16/2026</a:t>
             </a:fld>
             <a:endParaRPr lang="en-US"/>
           </a:p>
@@ -1031,13 +826,7 @@
       </p:sp>
       <p:sp>
         <p:nvSpPr>
-          <p:cNvPr id="5" name="Footer Placeholder 4">
-            <a:extLst>
-              <a:ext uri="{FF2B5EF4-FFF2-40B4-BE49-F238E27FC236}">
-                <a16:creationId xmlns:a16="http://schemas.microsoft.com/office/drawing/2014/main" id="{2C26C9BE-9060-50CB-2BB7-07307FF89A7A}"/>
-              </a:ext>
-            </a:extLst>
-          </p:cNvPr>
+          <p:cNvPr id="5" name="Footer Placeholder 4"/>
           <p:cNvSpPr>
             <a:spLocks noGrp="1"/>
           </p:cNvSpPr>
@@ -1056,13 +845,7 @@
       </p:sp>
       <p:sp>
         <p:nvSpPr>
-          <p:cNvPr id="6" name="Slide Number Placeholder 5">
-            <a:extLst>
-              <a:ext uri="{FF2B5EF4-FFF2-40B4-BE49-F238E27FC236}">
-                <a16:creationId xmlns:a16="http://schemas.microsoft.com/office/drawing/2014/main" id="{A84A835B-97D3-BC22-F0B8-4986D4636271}"/>
-              </a:ext>
-            </a:extLst>
-          </p:cNvPr>
+          <p:cNvPr id="6" name="Slide Number Placeholder 5"/>
           <p:cNvSpPr>
             <a:spLocks noGrp="1"/>
           </p:cNvSpPr>
@@ -1077,18 +860,12 @@
           <a:p>
             <a:fld id="{CC057153-B650-4DEB-B370-79DDCFDCE934}" type="slidenum">
               <a:rPr lang="en-US" smtClean="0"/>
-              <a:t>‹#›</a:t>
             </a:fld>
             <a:endParaRPr lang="en-US"/>
           </a:p>
         </p:txBody>
       </p:sp>
     </p:spTree>
-    <p:extLst>
-      <p:ext uri="{BB962C8B-B14F-4D97-AF65-F5344CB8AC3E}">
-        <p14:creationId xmlns:p14="http://schemas.microsoft.com/office/powerpoint/2010/main" val="3804107480"/>
-      </p:ext>
-    </p:extLst>
   </p:cSld>
   <p:clrMapOvr>
     <a:masterClrMapping/>
@@ -1115,13 +892,7 @@
       </p:grpSpPr>
       <p:sp>
         <p:nvSpPr>
-          <p:cNvPr id="2" name="Vertical Title 1">
-            <a:extLst>
-              <a:ext uri="{FF2B5EF4-FFF2-40B4-BE49-F238E27FC236}">
-                <a16:creationId xmlns:a16="http://schemas.microsoft.com/office/drawing/2014/main" id="{485B0252-346C-F6F4-3642-19F571550D45}"/>
-              </a:ext>
-            </a:extLst>
-          </p:cNvPr>
+          <p:cNvPr id="2" name="Vertical Title 1"/>
           <p:cNvSpPr>
             <a:spLocks noGrp="1"/>
           </p:cNvSpPr>
@@ -1149,13 +920,7 @@
       </p:sp>
       <p:sp>
         <p:nvSpPr>
-          <p:cNvPr id="3" name="Vertical Text Placeholder 2">
-            <a:extLst>
-              <a:ext uri="{FF2B5EF4-FFF2-40B4-BE49-F238E27FC236}">
-                <a16:creationId xmlns:a16="http://schemas.microsoft.com/office/drawing/2014/main" id="{F798DA36-7351-9D6A-518B-678AB8A507D3}"/>
-              </a:ext>
-            </a:extLst>
-          </p:cNvPr>
+          <p:cNvPr id="3" name="Vertical Text Placeholder 2"/>
           <p:cNvSpPr>
             <a:spLocks noGrp="1"/>
           </p:cNvSpPr>
@@ -1178,6 +943,7 @@
               <a:rPr lang="en-US"/>
               <a:t>Click to edit Master text styles</a:t>
             </a:r>
+            <a:endParaRPr lang="en-US"/>
           </a:p>
           <a:p>
             <a:pPr lvl="1"/>
@@ -1185,6 +951,7 @@
               <a:rPr lang="en-US"/>
               <a:t>Second level</a:t>
             </a:r>
+            <a:endParaRPr lang="en-US"/>
           </a:p>
           <a:p>
             <a:pPr lvl="2"/>
@@ -1192,6 +959,7 @@
               <a:rPr lang="en-US"/>
               <a:t>Third level</a:t>
             </a:r>
+            <a:endParaRPr lang="en-US"/>
           </a:p>
           <a:p>
             <a:pPr lvl="3"/>
@@ -1199,6 +967,7 @@
               <a:rPr lang="en-US"/>
               <a:t>Fourth level</a:t>
             </a:r>
+            <a:endParaRPr lang="en-US"/>
           </a:p>
           <a:p>
             <a:pPr lvl="4"/>
@@ -1212,13 +981,7 @@
       </p:sp>
       <p:sp>
         <p:nvSpPr>
-          <p:cNvPr id="4" name="Date Placeholder 3">
-            <a:extLst>
-              <a:ext uri="{FF2B5EF4-FFF2-40B4-BE49-F238E27FC236}">
-                <a16:creationId xmlns:a16="http://schemas.microsoft.com/office/drawing/2014/main" id="{8846BDFF-D746-836C-04B8-CA89AD5D1466}"/>
-              </a:ext>
-            </a:extLst>
-          </p:cNvPr>
+          <p:cNvPr id="4" name="Date Placeholder 3"/>
           <p:cNvSpPr>
             <a:spLocks noGrp="1"/>
           </p:cNvSpPr>
@@ -1233,7 +996,6 @@
           <a:p>
             <a:fld id="{9CF0EC4B-54ED-4041-B552-9BA760FA3DBA}" type="datetime1">
               <a:rPr lang="en-US" smtClean="0"/>
-              <a:t>2/16/2026</a:t>
             </a:fld>
             <a:endParaRPr lang="en-US"/>
           </a:p>
@@ -1241,13 +1003,7 @@
       </p:sp>
       <p:sp>
         <p:nvSpPr>
-          <p:cNvPr id="5" name="Footer Placeholder 4">
-            <a:extLst>
-              <a:ext uri="{FF2B5EF4-FFF2-40B4-BE49-F238E27FC236}">
-                <a16:creationId xmlns:a16="http://schemas.microsoft.com/office/drawing/2014/main" id="{919AA929-A9E6-FF9C-0C59-177F892D6A69}"/>
-              </a:ext>
-            </a:extLst>
-          </p:cNvPr>
+          <p:cNvPr id="5" name="Footer Placeholder 4"/>
           <p:cNvSpPr>
             <a:spLocks noGrp="1"/>
           </p:cNvSpPr>
@@ -1266,13 +1022,7 @@
       </p:sp>
       <p:sp>
         <p:nvSpPr>
-          <p:cNvPr id="6" name="Slide Number Placeholder 5">
-            <a:extLst>
-              <a:ext uri="{FF2B5EF4-FFF2-40B4-BE49-F238E27FC236}">
-                <a16:creationId xmlns:a16="http://schemas.microsoft.com/office/drawing/2014/main" id="{9316D893-7E81-90DC-4139-7687B39C3AC8}"/>
-              </a:ext>
-            </a:extLst>
-          </p:cNvPr>
+          <p:cNvPr id="6" name="Slide Number Placeholder 5"/>
           <p:cNvSpPr>
             <a:spLocks noGrp="1"/>
           </p:cNvSpPr>
@@ -1287,18 +1037,12 @@
           <a:p>
             <a:fld id="{CC057153-B650-4DEB-B370-79DDCFDCE934}" type="slidenum">
               <a:rPr lang="en-US" smtClean="0"/>
-              <a:t>‹#›</a:t>
             </a:fld>
             <a:endParaRPr lang="en-US"/>
           </a:p>
         </p:txBody>
       </p:sp>
     </p:spTree>
-    <p:extLst>
-      <p:ext uri="{BB962C8B-B14F-4D97-AF65-F5344CB8AC3E}">
-        <p14:creationId xmlns:p14="http://schemas.microsoft.com/office/powerpoint/2010/main" val="1031663675"/>
-      </p:ext>
-    </p:extLst>
   </p:cSld>
   <p:clrMapOvr>
     <a:masterClrMapping/>
@@ -1325,13 +1069,7 @@
       </p:grpSpPr>
       <p:sp>
         <p:nvSpPr>
-          <p:cNvPr id="2" name="Title 1">
-            <a:extLst>
-              <a:ext uri="{FF2B5EF4-FFF2-40B4-BE49-F238E27FC236}">
-                <a16:creationId xmlns:a16="http://schemas.microsoft.com/office/drawing/2014/main" id="{BC7433D9-FD02-59E2-0F81-A0B7201D2DA0}"/>
-              </a:ext>
-            </a:extLst>
-          </p:cNvPr>
+          <p:cNvPr id="2" name="Title 1"/>
           <p:cNvSpPr>
             <a:spLocks noGrp="1"/>
           </p:cNvSpPr>
@@ -1348,18 +1086,13 @@
               <a:rPr lang="en-US"/>
               <a:t>Click to edit Master title style</a:t>
             </a:r>
-          </a:p>
-        </p:txBody>
-      </p:sp>
-      <p:sp>
-        <p:nvSpPr>
-          <p:cNvPr id="3" name="Content Placeholder 2">
-            <a:extLst>
-              <a:ext uri="{FF2B5EF4-FFF2-40B4-BE49-F238E27FC236}">
-                <a16:creationId xmlns:a16="http://schemas.microsoft.com/office/drawing/2014/main" id="{6C2DD052-3E45-E789-01F8-33250024ECBD}"/>
-              </a:ext>
-            </a:extLst>
-          </p:cNvPr>
+            <a:endParaRPr lang="en-US"/>
+          </a:p>
+        </p:txBody>
+      </p:sp>
+      <p:sp>
+        <p:nvSpPr>
+          <p:cNvPr id="3" name="Content Placeholder 2"/>
           <p:cNvSpPr>
             <a:spLocks noGrp="1"/>
           </p:cNvSpPr>
@@ -1377,6 +1110,7 @@
               <a:rPr lang="en-US"/>
               <a:t>Click to edit Master text styles</a:t>
             </a:r>
+            <a:endParaRPr lang="en-US"/>
           </a:p>
           <a:p>
             <a:pPr lvl="1"/>
@@ -1384,6 +1118,7 @@
               <a:rPr lang="en-US"/>
               <a:t>Second level</a:t>
             </a:r>
+            <a:endParaRPr lang="en-US"/>
           </a:p>
           <a:p>
             <a:pPr lvl="2"/>
@@ -1391,6 +1126,7 @@
               <a:rPr lang="en-US"/>
               <a:t>Third level</a:t>
             </a:r>
+            <a:endParaRPr lang="en-US"/>
           </a:p>
           <a:p>
             <a:pPr lvl="3"/>
@@ -1398,6 +1134,7 @@
               <a:rPr lang="en-US"/>
               <a:t>Fourth level</a:t>
             </a:r>
+            <a:endParaRPr lang="en-US"/>
           </a:p>
           <a:p>
             <a:pPr lvl="4"/>
@@ -1405,18 +1142,13 @@
               <a:rPr lang="en-US"/>
               <a:t>Fifth level</a:t>
             </a:r>
-          </a:p>
-        </p:txBody>
-      </p:sp>
-      <p:sp>
-        <p:nvSpPr>
-          <p:cNvPr id="4" name="Date Placeholder 3">
-            <a:extLst>
-              <a:ext uri="{FF2B5EF4-FFF2-40B4-BE49-F238E27FC236}">
-                <a16:creationId xmlns:a16="http://schemas.microsoft.com/office/drawing/2014/main" id="{0B9485D1-E172-8F0A-A425-3097B3ABCFB4}"/>
-              </a:ext>
-            </a:extLst>
-          </p:cNvPr>
+            <a:endParaRPr lang="en-US"/>
+          </a:p>
+        </p:txBody>
+      </p:sp>
+      <p:sp>
+        <p:nvSpPr>
+          <p:cNvPr id="4" name="Date Placeholder 3"/>
           <p:cNvSpPr>
             <a:spLocks noGrp="1"/>
           </p:cNvSpPr>
@@ -1431,7 +1163,6 @@
           <a:p>
             <a:fld id="{51C1210E-201E-4473-82AC-2466F5386C38}" type="datetime1">
               <a:rPr lang="en-US" smtClean="0"/>
-              <a:t>2/16/2026</a:t>
             </a:fld>
             <a:endParaRPr lang="en-US"/>
           </a:p>
@@ -1439,13 +1170,7 @@
       </p:sp>
       <p:sp>
         <p:nvSpPr>
-          <p:cNvPr id="5" name="Footer Placeholder 4">
-            <a:extLst>
-              <a:ext uri="{FF2B5EF4-FFF2-40B4-BE49-F238E27FC236}">
-                <a16:creationId xmlns:a16="http://schemas.microsoft.com/office/drawing/2014/main" id="{B17E6B5E-6174-FD5C-41E8-FFC44C650D7E}"/>
-              </a:ext>
-            </a:extLst>
-          </p:cNvPr>
+          <p:cNvPr id="5" name="Footer Placeholder 4"/>
           <p:cNvSpPr>
             <a:spLocks noGrp="1"/>
           </p:cNvSpPr>
@@ -1464,13 +1189,7 @@
       </p:sp>
       <p:sp>
         <p:nvSpPr>
-          <p:cNvPr id="6" name="Slide Number Placeholder 5">
-            <a:extLst>
-              <a:ext uri="{FF2B5EF4-FFF2-40B4-BE49-F238E27FC236}">
-                <a16:creationId xmlns:a16="http://schemas.microsoft.com/office/drawing/2014/main" id="{4BF72154-F85B-E301-DA57-E314D7315916}"/>
-              </a:ext>
-            </a:extLst>
-          </p:cNvPr>
+          <p:cNvPr id="6" name="Slide Number Placeholder 5"/>
           <p:cNvSpPr>
             <a:spLocks noGrp="1"/>
           </p:cNvSpPr>
@@ -1485,18 +1204,12 @@
           <a:p>
             <a:fld id="{CC057153-B650-4DEB-B370-79DDCFDCE934}" type="slidenum">
               <a:rPr lang="en-US" smtClean="0"/>
-              <a:t>‹#›</a:t>
             </a:fld>
             <a:endParaRPr lang="en-US"/>
           </a:p>
         </p:txBody>
       </p:sp>
     </p:spTree>
-    <p:extLst>
-      <p:ext uri="{BB962C8B-B14F-4D97-AF65-F5344CB8AC3E}">
-        <p14:creationId xmlns:p14="http://schemas.microsoft.com/office/powerpoint/2010/main" val="1799540671"/>
-      </p:ext>
-    </p:extLst>
   </p:cSld>
   <p:clrMapOvr>
     <a:masterClrMapping/>
@@ -1523,13 +1236,7 @@
       </p:grpSpPr>
       <p:sp>
         <p:nvSpPr>
-          <p:cNvPr id="2" name="Title 1">
-            <a:extLst>
-              <a:ext uri="{FF2B5EF4-FFF2-40B4-BE49-F238E27FC236}">
-                <a16:creationId xmlns:a16="http://schemas.microsoft.com/office/drawing/2014/main" id="{951D06AF-EF87-8489-2C82-DEB90B7EFE0C}"/>
-              </a:ext>
-            </a:extLst>
-          </p:cNvPr>
+          <p:cNvPr id="2" name="Title 1"/>
           <p:cNvSpPr>
             <a:spLocks noGrp="1"/>
           </p:cNvSpPr>
@@ -1563,13 +1270,7 @@
       </p:sp>
       <p:sp>
         <p:nvSpPr>
-          <p:cNvPr id="3" name="Text Placeholder 2">
-            <a:extLst>
-              <a:ext uri="{FF2B5EF4-FFF2-40B4-BE49-F238E27FC236}">
-                <a16:creationId xmlns:a16="http://schemas.microsoft.com/office/drawing/2014/main" id="{308E5678-CA38-1318-9EA2-5E0A4F9A59BA}"/>
-              </a:ext>
-            </a:extLst>
-          </p:cNvPr>
+          <p:cNvPr id="3" name="Text Placeholder 2"/>
           <p:cNvSpPr>
             <a:spLocks noGrp="1"/>
           </p:cNvSpPr>
@@ -1683,18 +1384,13 @@
               <a:rPr lang="en-US"/>
               <a:t>Click to edit Master text styles</a:t>
             </a:r>
-          </a:p>
-        </p:txBody>
-      </p:sp>
-      <p:sp>
-        <p:nvSpPr>
-          <p:cNvPr id="4" name="Date Placeholder 3">
-            <a:extLst>
-              <a:ext uri="{FF2B5EF4-FFF2-40B4-BE49-F238E27FC236}">
-                <a16:creationId xmlns:a16="http://schemas.microsoft.com/office/drawing/2014/main" id="{44E99186-7E5A-60AF-DE69-5C7DA71611AB}"/>
-              </a:ext>
-            </a:extLst>
-          </p:cNvPr>
+            <a:endParaRPr lang="en-US"/>
+          </a:p>
+        </p:txBody>
+      </p:sp>
+      <p:sp>
+        <p:nvSpPr>
+          <p:cNvPr id="4" name="Date Placeholder 3"/>
           <p:cNvSpPr>
             <a:spLocks noGrp="1"/>
           </p:cNvSpPr>
@@ -1709,7 +1405,6 @@
           <a:p>
             <a:fld id="{B01EA198-6CAB-4B8F-B93F-1F9C8C4B6CE7}" type="datetime1">
               <a:rPr lang="en-US" smtClean="0"/>
-              <a:t>2/16/2026</a:t>
             </a:fld>
             <a:endParaRPr lang="en-US"/>
           </a:p>
@@ -1717,13 +1412,7 @@
       </p:sp>
       <p:sp>
         <p:nvSpPr>
-          <p:cNvPr id="5" name="Footer Placeholder 4">
-            <a:extLst>
-              <a:ext uri="{FF2B5EF4-FFF2-40B4-BE49-F238E27FC236}">
-                <a16:creationId xmlns:a16="http://schemas.microsoft.com/office/drawing/2014/main" id="{82FA13D1-1FBA-E820-323B-77B41F1A665D}"/>
-              </a:ext>
-            </a:extLst>
-          </p:cNvPr>
+          <p:cNvPr id="5" name="Footer Placeholder 4"/>
           <p:cNvSpPr>
             <a:spLocks noGrp="1"/>
           </p:cNvSpPr>
@@ -1742,13 +1431,7 @@
       </p:sp>
       <p:sp>
         <p:nvSpPr>
-          <p:cNvPr id="6" name="Slide Number Placeholder 5">
-            <a:extLst>
-              <a:ext uri="{FF2B5EF4-FFF2-40B4-BE49-F238E27FC236}">
-                <a16:creationId xmlns:a16="http://schemas.microsoft.com/office/drawing/2014/main" id="{FB39BE85-85F6-4636-C651-D87CC969A49E}"/>
-              </a:ext>
-            </a:extLst>
-          </p:cNvPr>
+          <p:cNvPr id="6" name="Slide Number Placeholder 5"/>
           <p:cNvSpPr>
             <a:spLocks noGrp="1"/>
           </p:cNvSpPr>
@@ -1763,18 +1446,12 @@
           <a:p>
             <a:fld id="{CC057153-B650-4DEB-B370-79DDCFDCE934}" type="slidenum">
               <a:rPr lang="en-US" smtClean="0"/>
-              <a:t>‹#›</a:t>
             </a:fld>
             <a:endParaRPr lang="en-US"/>
           </a:p>
         </p:txBody>
       </p:sp>
     </p:spTree>
-    <p:extLst>
-      <p:ext uri="{BB962C8B-B14F-4D97-AF65-F5344CB8AC3E}">
-        <p14:creationId xmlns:p14="http://schemas.microsoft.com/office/powerpoint/2010/main" val="1444616203"/>
-      </p:ext>
-    </p:extLst>
   </p:cSld>
   <p:clrMapOvr>
     <a:masterClrMapping/>
@@ -1801,13 +1478,7 @@
       </p:grpSpPr>
       <p:sp>
         <p:nvSpPr>
-          <p:cNvPr id="2" name="Title 1">
-            <a:extLst>
-              <a:ext uri="{FF2B5EF4-FFF2-40B4-BE49-F238E27FC236}">
-                <a16:creationId xmlns:a16="http://schemas.microsoft.com/office/drawing/2014/main" id="{FAF3BB49-A328-F121-7F27-DEB7C3CC2B0F}"/>
-              </a:ext>
-            </a:extLst>
-          </p:cNvPr>
+          <p:cNvPr id="2" name="Title 1"/>
           <p:cNvSpPr>
             <a:spLocks noGrp="1"/>
           </p:cNvSpPr>
@@ -1835,13 +1506,7 @@
       </p:sp>
       <p:sp>
         <p:nvSpPr>
-          <p:cNvPr id="3" name="Content Placeholder 2">
-            <a:extLst>
-              <a:ext uri="{FF2B5EF4-FFF2-40B4-BE49-F238E27FC236}">
-                <a16:creationId xmlns:a16="http://schemas.microsoft.com/office/drawing/2014/main" id="{572E861E-DFBA-B4AA-9356-CDE3D3F57C04}"/>
-              </a:ext>
-            </a:extLst>
-          </p:cNvPr>
+          <p:cNvPr id="3" name="Content Placeholder 2"/>
           <p:cNvSpPr>
             <a:spLocks noGrp="1"/>
           </p:cNvSpPr>
@@ -1864,6 +1529,7 @@
               <a:rPr lang="en-US"/>
               <a:t>Click to edit Master text styles</a:t>
             </a:r>
+            <a:endParaRPr lang="en-US"/>
           </a:p>
           <a:p>
             <a:pPr lvl="1"/>
@@ -1871,6 +1537,7 @@
               <a:rPr lang="en-US"/>
               <a:t>Second level</a:t>
             </a:r>
+            <a:endParaRPr lang="en-US"/>
           </a:p>
           <a:p>
             <a:pPr lvl="2"/>
@@ -1878,6 +1545,7 @@
               <a:rPr lang="en-US"/>
               <a:t>Third level</a:t>
             </a:r>
+            <a:endParaRPr lang="en-US"/>
           </a:p>
           <a:p>
             <a:pPr lvl="3"/>
@@ -1885,6 +1553,7 @@
               <a:rPr lang="en-US"/>
               <a:t>Fourth level</a:t>
             </a:r>
+            <a:endParaRPr lang="en-US"/>
           </a:p>
           <a:p>
             <a:pPr lvl="4"/>
@@ -1898,13 +1567,7 @@
       </p:sp>
       <p:sp>
         <p:nvSpPr>
-          <p:cNvPr id="4" name="Content Placeholder 3">
-            <a:extLst>
-              <a:ext uri="{FF2B5EF4-FFF2-40B4-BE49-F238E27FC236}">
-                <a16:creationId xmlns:a16="http://schemas.microsoft.com/office/drawing/2014/main" id="{451D7538-EC5A-3EE7-176F-A58920C50797}"/>
-              </a:ext>
-            </a:extLst>
-          </p:cNvPr>
+          <p:cNvPr id="4" name="Content Placeholder 3"/>
           <p:cNvSpPr>
             <a:spLocks noGrp="1"/>
           </p:cNvSpPr>
@@ -1927,6 +1590,7 @@
               <a:rPr lang="en-US"/>
               <a:t>Click to edit Master text styles</a:t>
             </a:r>
+            <a:endParaRPr lang="en-US"/>
           </a:p>
           <a:p>
             <a:pPr lvl="1"/>
@@ -1934,6 +1598,7 @@
               <a:rPr lang="en-US"/>
               <a:t>Second level</a:t>
             </a:r>
+            <a:endParaRPr lang="en-US"/>
           </a:p>
           <a:p>
             <a:pPr lvl="2"/>
@@ -1941,6 +1606,7 @@
               <a:rPr lang="en-US"/>
               <a:t>Third level</a:t>
             </a:r>
+            <a:endParaRPr lang="en-US"/>
           </a:p>
           <a:p>
             <a:pPr lvl="3"/>
@@ -1948,6 +1614,7 @@
               <a:rPr lang="en-US"/>
               <a:t>Fourth level</a:t>
             </a:r>
+            <a:endParaRPr lang="en-US"/>
           </a:p>
           <a:p>
             <a:pPr lvl="4"/>
@@ -1955,18 +1622,13 @@
               <a:rPr lang="en-US"/>
               <a:t>Fifth level</a:t>
             </a:r>
-          </a:p>
-        </p:txBody>
-      </p:sp>
-      <p:sp>
-        <p:nvSpPr>
-          <p:cNvPr id="5" name="Date Placeholder 4">
-            <a:extLst>
-              <a:ext uri="{FF2B5EF4-FFF2-40B4-BE49-F238E27FC236}">
-                <a16:creationId xmlns:a16="http://schemas.microsoft.com/office/drawing/2014/main" id="{897D0B7E-1A60-DA52-6965-92412B1C2F9F}"/>
-              </a:ext>
-            </a:extLst>
-          </p:cNvPr>
+            <a:endParaRPr lang="en-US"/>
+          </a:p>
+        </p:txBody>
+      </p:sp>
+      <p:sp>
+        <p:nvSpPr>
+          <p:cNvPr id="5" name="Date Placeholder 4"/>
           <p:cNvSpPr>
             <a:spLocks noGrp="1"/>
           </p:cNvSpPr>
@@ -1981,7 +1643,6 @@
           <a:p>
             <a:fld id="{CA06041F-4525-44D5-AA4F-332294BF1F56}" type="datetime1">
               <a:rPr lang="en-US" smtClean="0"/>
-              <a:t>2/16/2026</a:t>
             </a:fld>
             <a:endParaRPr lang="en-US"/>
           </a:p>
@@ -1989,13 +1650,7 @@
       </p:sp>
       <p:sp>
         <p:nvSpPr>
-          <p:cNvPr id="6" name="Footer Placeholder 5">
-            <a:extLst>
-              <a:ext uri="{FF2B5EF4-FFF2-40B4-BE49-F238E27FC236}">
-                <a16:creationId xmlns:a16="http://schemas.microsoft.com/office/drawing/2014/main" id="{C2BDD5A2-CE3E-3215-6DAA-F75C0D1229DA}"/>
-              </a:ext>
-            </a:extLst>
-          </p:cNvPr>
+          <p:cNvPr id="6" name="Footer Placeholder 5"/>
           <p:cNvSpPr>
             <a:spLocks noGrp="1"/>
           </p:cNvSpPr>
@@ -2014,13 +1669,7 @@
       </p:sp>
       <p:sp>
         <p:nvSpPr>
-          <p:cNvPr id="7" name="Slide Number Placeholder 6">
-            <a:extLst>
-              <a:ext uri="{FF2B5EF4-FFF2-40B4-BE49-F238E27FC236}">
-                <a16:creationId xmlns:a16="http://schemas.microsoft.com/office/drawing/2014/main" id="{B1B822F1-284A-1786-FAF2-72129E2FE64D}"/>
-              </a:ext>
-            </a:extLst>
-          </p:cNvPr>
+          <p:cNvPr id="7" name="Slide Number Placeholder 6"/>
           <p:cNvSpPr>
             <a:spLocks noGrp="1"/>
           </p:cNvSpPr>
@@ -2035,18 +1684,12 @@
           <a:p>
             <a:fld id="{CC057153-B650-4DEB-B370-79DDCFDCE934}" type="slidenum">
               <a:rPr lang="en-US" smtClean="0"/>
-              <a:t>‹#›</a:t>
             </a:fld>
             <a:endParaRPr lang="en-US"/>
           </a:p>
         </p:txBody>
       </p:sp>
     </p:spTree>
-    <p:extLst>
-      <p:ext uri="{BB962C8B-B14F-4D97-AF65-F5344CB8AC3E}">
-        <p14:creationId xmlns:p14="http://schemas.microsoft.com/office/powerpoint/2010/main" val="3084377942"/>
-      </p:ext>
-    </p:extLst>
   </p:cSld>
   <p:clrMapOvr>
     <a:masterClrMapping/>
@@ -2073,13 +1716,7 @@
       </p:grpSpPr>
       <p:sp>
         <p:nvSpPr>
-          <p:cNvPr id="2" name="Title 1">
-            <a:extLst>
-              <a:ext uri="{FF2B5EF4-FFF2-40B4-BE49-F238E27FC236}">
-                <a16:creationId xmlns:a16="http://schemas.microsoft.com/office/drawing/2014/main" id="{41FEE969-634D-6E32-D227-18E9282C6F9E}"/>
-              </a:ext>
-            </a:extLst>
-          </p:cNvPr>
+          <p:cNvPr id="2" name="Title 1"/>
           <p:cNvSpPr>
             <a:spLocks noGrp="1"/>
           </p:cNvSpPr>
@@ -2107,13 +1744,7 @@
       </p:sp>
       <p:sp>
         <p:nvSpPr>
-          <p:cNvPr id="3" name="Text Placeholder 2">
-            <a:extLst>
-              <a:ext uri="{FF2B5EF4-FFF2-40B4-BE49-F238E27FC236}">
-                <a16:creationId xmlns:a16="http://schemas.microsoft.com/office/drawing/2014/main" id="{61CD26D4-290A-F0ED-7D62-41EDA6FEC2B9}"/>
-              </a:ext>
-            </a:extLst>
-          </p:cNvPr>
+          <p:cNvPr id="3" name="Text Placeholder 2"/>
           <p:cNvSpPr>
             <a:spLocks noGrp="1"/>
           </p:cNvSpPr>
@@ -2178,18 +1809,13 @@
               <a:rPr lang="en-US"/>
               <a:t>Click to edit Master text styles</a:t>
             </a:r>
-          </a:p>
-        </p:txBody>
-      </p:sp>
-      <p:sp>
-        <p:nvSpPr>
-          <p:cNvPr id="4" name="Content Placeholder 3">
-            <a:extLst>
-              <a:ext uri="{FF2B5EF4-FFF2-40B4-BE49-F238E27FC236}">
-                <a16:creationId xmlns:a16="http://schemas.microsoft.com/office/drawing/2014/main" id="{94DA52B0-7419-A946-4523-6D34BCAD26D1}"/>
-              </a:ext>
-            </a:extLst>
-          </p:cNvPr>
+            <a:endParaRPr lang="en-US"/>
+          </a:p>
+        </p:txBody>
+      </p:sp>
+      <p:sp>
+        <p:nvSpPr>
+          <p:cNvPr id="4" name="Content Placeholder 3"/>
           <p:cNvSpPr>
             <a:spLocks noGrp="1"/>
           </p:cNvSpPr>
@@ -2212,6 +1838,7 @@
               <a:rPr lang="en-US"/>
               <a:t>Click to edit Master text styles</a:t>
             </a:r>
+            <a:endParaRPr lang="en-US"/>
           </a:p>
           <a:p>
             <a:pPr lvl="1"/>
@@ -2219,6 +1846,7 @@
               <a:rPr lang="en-US"/>
               <a:t>Second level</a:t>
             </a:r>
+            <a:endParaRPr lang="en-US"/>
           </a:p>
           <a:p>
             <a:pPr lvl="2"/>
@@ -2226,6 +1854,7 @@
               <a:rPr lang="en-US"/>
               <a:t>Third level</a:t>
             </a:r>
+            <a:endParaRPr lang="en-US"/>
           </a:p>
           <a:p>
             <a:pPr lvl="3"/>
@@ -2233,6 +1862,7 @@
               <a:rPr lang="en-US"/>
               <a:t>Fourth level</a:t>
             </a:r>
+            <a:endParaRPr lang="en-US"/>
           </a:p>
           <a:p>
             <a:pPr lvl="4"/>
@@ -2246,13 +1876,7 @@
       </p:sp>
       <p:sp>
         <p:nvSpPr>
-          <p:cNvPr id="5" name="Text Placeholder 4">
-            <a:extLst>
-              <a:ext uri="{FF2B5EF4-FFF2-40B4-BE49-F238E27FC236}">
-                <a16:creationId xmlns:a16="http://schemas.microsoft.com/office/drawing/2014/main" id="{06536620-C4F3-EEC3-DBF1-05196B1CBB55}"/>
-              </a:ext>
-            </a:extLst>
-          </p:cNvPr>
+          <p:cNvPr id="5" name="Text Placeholder 4"/>
           <p:cNvSpPr>
             <a:spLocks noGrp="1"/>
           </p:cNvSpPr>
@@ -2317,18 +1941,13 @@
               <a:rPr lang="en-US"/>
               <a:t>Click to edit Master text styles</a:t>
             </a:r>
-          </a:p>
-        </p:txBody>
-      </p:sp>
-      <p:sp>
-        <p:nvSpPr>
-          <p:cNvPr id="6" name="Content Placeholder 5">
-            <a:extLst>
-              <a:ext uri="{FF2B5EF4-FFF2-40B4-BE49-F238E27FC236}">
-                <a16:creationId xmlns:a16="http://schemas.microsoft.com/office/drawing/2014/main" id="{33BAE980-E611-98B5-04E9-DE4584B0E33F}"/>
-              </a:ext>
-            </a:extLst>
-          </p:cNvPr>
+            <a:endParaRPr lang="en-US"/>
+          </a:p>
+        </p:txBody>
+      </p:sp>
+      <p:sp>
+        <p:nvSpPr>
+          <p:cNvPr id="6" name="Content Placeholder 5"/>
           <p:cNvSpPr>
             <a:spLocks noGrp="1"/>
           </p:cNvSpPr>
@@ -2351,6 +1970,7 @@
               <a:rPr lang="en-US"/>
               <a:t>Click to edit Master text styles</a:t>
             </a:r>
+            <a:endParaRPr lang="en-US"/>
           </a:p>
           <a:p>
             <a:pPr lvl="1"/>
@@ -2358,6 +1978,7 @@
               <a:rPr lang="en-US"/>
               <a:t>Second level</a:t>
             </a:r>
+            <a:endParaRPr lang="en-US"/>
           </a:p>
           <a:p>
             <a:pPr lvl="2"/>
@@ -2365,6 +1986,7 @@
               <a:rPr lang="en-US"/>
               <a:t>Third level</a:t>
             </a:r>
+            <a:endParaRPr lang="en-US"/>
           </a:p>
           <a:p>
             <a:pPr lvl="3"/>
@@ -2372,6 +1994,7 @@
               <a:rPr lang="en-US"/>
               <a:t>Fourth level</a:t>
             </a:r>
+            <a:endParaRPr lang="en-US"/>
           </a:p>
           <a:p>
             <a:pPr lvl="4"/>
@@ -2379,18 +2002,13 @@
               <a:rPr lang="en-US"/>
               <a:t>Fifth level</a:t>
             </a:r>
-          </a:p>
-        </p:txBody>
-      </p:sp>
-      <p:sp>
-        <p:nvSpPr>
-          <p:cNvPr id="7" name="Date Placeholder 6">
-            <a:extLst>
-              <a:ext uri="{FF2B5EF4-FFF2-40B4-BE49-F238E27FC236}">
-                <a16:creationId xmlns:a16="http://schemas.microsoft.com/office/drawing/2014/main" id="{4E3B3581-658A-8487-F9CB-E79F2BFF27E4}"/>
-              </a:ext>
-            </a:extLst>
-          </p:cNvPr>
+            <a:endParaRPr lang="en-US"/>
+          </a:p>
+        </p:txBody>
+      </p:sp>
+      <p:sp>
+        <p:nvSpPr>
+          <p:cNvPr id="7" name="Date Placeholder 6"/>
           <p:cNvSpPr>
             <a:spLocks noGrp="1"/>
           </p:cNvSpPr>
@@ -2405,7 +2023,6 @@
           <a:p>
             <a:fld id="{F9557091-BBDF-4EB9-BA6B-2BB67AC4FC0F}" type="datetime1">
               <a:rPr lang="en-US" smtClean="0"/>
-              <a:t>2/16/2026</a:t>
             </a:fld>
             <a:endParaRPr lang="en-US"/>
           </a:p>
@@ -2413,13 +2030,7 @@
       </p:sp>
       <p:sp>
         <p:nvSpPr>
-          <p:cNvPr id="8" name="Footer Placeholder 7">
-            <a:extLst>
-              <a:ext uri="{FF2B5EF4-FFF2-40B4-BE49-F238E27FC236}">
-                <a16:creationId xmlns:a16="http://schemas.microsoft.com/office/drawing/2014/main" id="{949D76D8-9033-26CF-BF4C-AECCC685C177}"/>
-              </a:ext>
-            </a:extLst>
-          </p:cNvPr>
+          <p:cNvPr id="8" name="Footer Placeholder 7"/>
           <p:cNvSpPr>
             <a:spLocks noGrp="1"/>
           </p:cNvSpPr>
@@ -2438,13 +2049,7 @@
       </p:sp>
       <p:sp>
         <p:nvSpPr>
-          <p:cNvPr id="9" name="Slide Number Placeholder 8">
-            <a:extLst>
-              <a:ext uri="{FF2B5EF4-FFF2-40B4-BE49-F238E27FC236}">
-                <a16:creationId xmlns:a16="http://schemas.microsoft.com/office/drawing/2014/main" id="{E02A06B8-CC1D-542F-D8EB-7625046B91D2}"/>
-              </a:ext>
-            </a:extLst>
-          </p:cNvPr>
+          <p:cNvPr id="9" name="Slide Number Placeholder 8"/>
           <p:cNvSpPr>
             <a:spLocks noGrp="1"/>
           </p:cNvSpPr>
@@ -2459,18 +2064,12 @@
           <a:p>
             <a:fld id="{CC057153-B650-4DEB-B370-79DDCFDCE934}" type="slidenum">
               <a:rPr lang="en-US" smtClean="0"/>
-              <a:t>‹#›</a:t>
             </a:fld>
             <a:endParaRPr lang="en-US"/>
           </a:p>
         </p:txBody>
       </p:sp>
     </p:spTree>
-    <p:extLst>
-      <p:ext uri="{BB962C8B-B14F-4D97-AF65-F5344CB8AC3E}">
-        <p14:creationId xmlns:p14="http://schemas.microsoft.com/office/powerpoint/2010/main" val="2269715007"/>
-      </p:ext>
-    </p:extLst>
   </p:cSld>
   <p:clrMapOvr>
     <a:masterClrMapping/>
@@ -2497,13 +2096,7 @@
       </p:grpSpPr>
       <p:sp>
         <p:nvSpPr>
-          <p:cNvPr id="2" name="Title 1">
-            <a:extLst>
-              <a:ext uri="{FF2B5EF4-FFF2-40B4-BE49-F238E27FC236}">
-                <a16:creationId xmlns:a16="http://schemas.microsoft.com/office/drawing/2014/main" id="{666A9F42-7FF7-F803-C075-BC4968D35E34}"/>
-              </a:ext>
-            </a:extLst>
-          </p:cNvPr>
+          <p:cNvPr id="2" name="Title 1"/>
           <p:cNvSpPr>
             <a:spLocks noGrp="1"/>
           </p:cNvSpPr>
@@ -2520,18 +2113,13 @@
               <a:rPr lang="en-US"/>
               <a:t>Click to edit Master title style</a:t>
             </a:r>
-          </a:p>
-        </p:txBody>
-      </p:sp>
-      <p:sp>
-        <p:nvSpPr>
-          <p:cNvPr id="3" name="Date Placeholder 2">
-            <a:extLst>
-              <a:ext uri="{FF2B5EF4-FFF2-40B4-BE49-F238E27FC236}">
-                <a16:creationId xmlns:a16="http://schemas.microsoft.com/office/drawing/2014/main" id="{E89E8268-7232-2944-F1BD-399F9419B563}"/>
-              </a:ext>
-            </a:extLst>
-          </p:cNvPr>
+            <a:endParaRPr lang="en-US"/>
+          </a:p>
+        </p:txBody>
+      </p:sp>
+      <p:sp>
+        <p:nvSpPr>
+          <p:cNvPr id="3" name="Date Placeholder 2"/>
           <p:cNvSpPr>
             <a:spLocks noGrp="1"/>
           </p:cNvSpPr>
@@ -2546,7 +2134,6 @@
           <a:p>
             <a:fld id="{2D6B226B-77A6-410C-9796-083F278E0125}" type="datetime1">
               <a:rPr lang="en-US" smtClean="0"/>
-              <a:t>2/16/2026</a:t>
             </a:fld>
             <a:endParaRPr lang="en-US"/>
           </a:p>
@@ -2554,13 +2141,7 @@
       </p:sp>
       <p:sp>
         <p:nvSpPr>
-          <p:cNvPr id="4" name="Footer Placeholder 3">
-            <a:extLst>
-              <a:ext uri="{FF2B5EF4-FFF2-40B4-BE49-F238E27FC236}">
-                <a16:creationId xmlns:a16="http://schemas.microsoft.com/office/drawing/2014/main" id="{6B968DDD-323F-89A1-84E3-DDBA626D9386}"/>
-              </a:ext>
-            </a:extLst>
-          </p:cNvPr>
+          <p:cNvPr id="4" name="Footer Placeholder 3"/>
           <p:cNvSpPr>
             <a:spLocks noGrp="1"/>
           </p:cNvSpPr>
@@ -2579,13 +2160,7 @@
       </p:sp>
       <p:sp>
         <p:nvSpPr>
-          <p:cNvPr id="5" name="Slide Number Placeholder 4">
-            <a:extLst>
-              <a:ext uri="{FF2B5EF4-FFF2-40B4-BE49-F238E27FC236}">
-                <a16:creationId xmlns:a16="http://schemas.microsoft.com/office/drawing/2014/main" id="{98FBDC76-671D-1671-DCE2-D5658BD40E29}"/>
-              </a:ext>
-            </a:extLst>
-          </p:cNvPr>
+          <p:cNvPr id="5" name="Slide Number Placeholder 4"/>
           <p:cNvSpPr>
             <a:spLocks noGrp="1"/>
           </p:cNvSpPr>
@@ -2600,18 +2175,12 @@
           <a:p>
             <a:fld id="{CC057153-B650-4DEB-B370-79DDCFDCE934}" type="slidenum">
               <a:rPr lang="en-US" smtClean="0"/>
-              <a:t>‹#›</a:t>
             </a:fld>
             <a:endParaRPr lang="en-US"/>
           </a:p>
         </p:txBody>
       </p:sp>
     </p:spTree>
-    <p:extLst>
-      <p:ext uri="{BB962C8B-B14F-4D97-AF65-F5344CB8AC3E}">
-        <p14:creationId xmlns:p14="http://schemas.microsoft.com/office/powerpoint/2010/main" val="3717121088"/>
-      </p:ext>
-    </p:extLst>
   </p:cSld>
   <p:clrMapOvr>
     <a:masterClrMapping/>
@@ -2638,13 +2207,7 @@
       </p:grpSpPr>
       <p:sp>
         <p:nvSpPr>
-          <p:cNvPr id="2" name="Date Placeholder 1">
-            <a:extLst>
-              <a:ext uri="{FF2B5EF4-FFF2-40B4-BE49-F238E27FC236}">
-                <a16:creationId xmlns:a16="http://schemas.microsoft.com/office/drawing/2014/main" id="{49BC4D82-0182-501C-9231-46767680476E}"/>
-              </a:ext>
-            </a:extLst>
-          </p:cNvPr>
+          <p:cNvPr id="2" name="Date Placeholder 1"/>
           <p:cNvSpPr>
             <a:spLocks noGrp="1"/>
           </p:cNvSpPr>
@@ -2659,7 +2222,6 @@
           <a:p>
             <a:fld id="{A23A578B-D289-4C40-8593-3D356C49DA58}" type="datetime1">
               <a:rPr lang="en-US" smtClean="0"/>
-              <a:t>2/16/2026</a:t>
             </a:fld>
             <a:endParaRPr lang="en-US"/>
           </a:p>
@@ -2667,13 +2229,7 @@
       </p:sp>
       <p:sp>
         <p:nvSpPr>
-          <p:cNvPr id="3" name="Footer Placeholder 2">
-            <a:extLst>
-              <a:ext uri="{FF2B5EF4-FFF2-40B4-BE49-F238E27FC236}">
-                <a16:creationId xmlns:a16="http://schemas.microsoft.com/office/drawing/2014/main" id="{10EAA6C9-A7F3-19F1-D17C-A1D83FAF553F}"/>
-              </a:ext>
-            </a:extLst>
-          </p:cNvPr>
+          <p:cNvPr id="3" name="Footer Placeholder 2"/>
           <p:cNvSpPr>
             <a:spLocks noGrp="1"/>
           </p:cNvSpPr>
@@ -2692,13 +2248,7 @@
       </p:sp>
       <p:sp>
         <p:nvSpPr>
-          <p:cNvPr id="4" name="Slide Number Placeholder 3">
-            <a:extLst>
-              <a:ext uri="{FF2B5EF4-FFF2-40B4-BE49-F238E27FC236}">
-                <a16:creationId xmlns:a16="http://schemas.microsoft.com/office/drawing/2014/main" id="{34EBB816-1B94-116F-92D4-6043AE9E0C6B}"/>
-              </a:ext>
-            </a:extLst>
-          </p:cNvPr>
+          <p:cNvPr id="4" name="Slide Number Placeholder 3"/>
           <p:cNvSpPr>
             <a:spLocks noGrp="1"/>
           </p:cNvSpPr>
@@ -2713,18 +2263,12 @@
           <a:p>
             <a:fld id="{CC057153-B650-4DEB-B370-79DDCFDCE934}" type="slidenum">
               <a:rPr lang="en-US" smtClean="0"/>
-              <a:t>‹#›</a:t>
             </a:fld>
             <a:endParaRPr lang="en-US"/>
           </a:p>
         </p:txBody>
       </p:sp>
     </p:spTree>
-    <p:extLst>
-      <p:ext uri="{BB962C8B-B14F-4D97-AF65-F5344CB8AC3E}">
-        <p14:creationId xmlns:p14="http://schemas.microsoft.com/office/powerpoint/2010/main" val="4122336863"/>
-      </p:ext>
-    </p:extLst>
   </p:cSld>
   <p:clrMapOvr>
     <a:masterClrMapping/>
@@ -2751,13 +2295,7 @@
       </p:grpSpPr>
       <p:sp>
         <p:nvSpPr>
-          <p:cNvPr id="2" name="Title 1">
-            <a:extLst>
-              <a:ext uri="{FF2B5EF4-FFF2-40B4-BE49-F238E27FC236}">
-                <a16:creationId xmlns:a16="http://schemas.microsoft.com/office/drawing/2014/main" id="{C350C37F-77BE-E128-4248-D001C39E79C6}"/>
-              </a:ext>
-            </a:extLst>
-          </p:cNvPr>
+          <p:cNvPr id="2" name="Title 1"/>
           <p:cNvSpPr>
             <a:spLocks noGrp="1"/>
           </p:cNvSpPr>
@@ -2791,13 +2329,7 @@
       </p:sp>
       <p:sp>
         <p:nvSpPr>
-          <p:cNvPr id="3" name="Content Placeholder 2">
-            <a:extLst>
-              <a:ext uri="{FF2B5EF4-FFF2-40B4-BE49-F238E27FC236}">
-                <a16:creationId xmlns:a16="http://schemas.microsoft.com/office/drawing/2014/main" id="{2F3B20A8-A604-C977-02C0-083BA8663484}"/>
-              </a:ext>
-            </a:extLst>
-          </p:cNvPr>
+          <p:cNvPr id="3" name="Content Placeholder 2"/>
           <p:cNvSpPr>
             <a:spLocks noGrp="1"/>
           </p:cNvSpPr>
@@ -2850,6 +2382,7 @@
               <a:rPr lang="en-US"/>
               <a:t>Click to edit Master text styles</a:t>
             </a:r>
+            <a:endParaRPr lang="en-US"/>
           </a:p>
           <a:p>
             <a:pPr lvl="1"/>
@@ -2857,6 +2390,7 @@
               <a:rPr lang="en-US"/>
               <a:t>Second level</a:t>
             </a:r>
+            <a:endParaRPr lang="en-US"/>
           </a:p>
           <a:p>
             <a:pPr lvl="2"/>
@@ -2864,6 +2398,7 @@
               <a:rPr lang="en-US"/>
               <a:t>Third level</a:t>
             </a:r>
+            <a:endParaRPr lang="en-US"/>
           </a:p>
           <a:p>
             <a:pPr lvl="3"/>
@@ -2871,6 +2406,7 @@
               <a:rPr lang="en-US"/>
               <a:t>Fourth level</a:t>
             </a:r>
+            <a:endParaRPr lang="en-US"/>
           </a:p>
           <a:p>
             <a:pPr lvl="4"/>
@@ -2884,13 +2420,7 @@
       </p:sp>
       <p:sp>
         <p:nvSpPr>
-          <p:cNvPr id="4" name="Text Placeholder 3">
-            <a:extLst>
-              <a:ext uri="{FF2B5EF4-FFF2-40B4-BE49-F238E27FC236}">
-                <a16:creationId xmlns:a16="http://schemas.microsoft.com/office/drawing/2014/main" id="{EC0EEBFB-2026-6A35-33ED-F008376B67A0}"/>
-              </a:ext>
-            </a:extLst>
-          </p:cNvPr>
+          <p:cNvPr id="4" name="Text Placeholder 3"/>
           <p:cNvSpPr>
             <a:spLocks noGrp="1"/>
           </p:cNvSpPr>
@@ -2952,18 +2482,13 @@
               <a:rPr lang="en-US"/>
               <a:t>Click to edit Master text styles</a:t>
             </a:r>
-          </a:p>
-        </p:txBody>
-      </p:sp>
-      <p:sp>
-        <p:nvSpPr>
-          <p:cNvPr id="5" name="Date Placeholder 4">
-            <a:extLst>
-              <a:ext uri="{FF2B5EF4-FFF2-40B4-BE49-F238E27FC236}">
-                <a16:creationId xmlns:a16="http://schemas.microsoft.com/office/drawing/2014/main" id="{93F05638-7A56-469A-825A-1DFA600254C8}"/>
-              </a:ext>
-            </a:extLst>
-          </p:cNvPr>
+            <a:endParaRPr lang="en-US"/>
+          </a:p>
+        </p:txBody>
+      </p:sp>
+      <p:sp>
+        <p:nvSpPr>
+          <p:cNvPr id="5" name="Date Placeholder 4"/>
           <p:cNvSpPr>
             <a:spLocks noGrp="1"/>
           </p:cNvSpPr>
@@ -2978,7 +2503,6 @@
           <a:p>
             <a:fld id="{713DFAE3-14DB-48A7-A80F-80DDB072CE3D}" type="datetime1">
               <a:rPr lang="en-US" smtClean="0"/>
-              <a:t>2/16/2026</a:t>
             </a:fld>
             <a:endParaRPr lang="en-US"/>
           </a:p>
@@ -2986,13 +2510,7 @@
       </p:sp>
       <p:sp>
         <p:nvSpPr>
-          <p:cNvPr id="6" name="Footer Placeholder 5">
-            <a:extLst>
-              <a:ext uri="{FF2B5EF4-FFF2-40B4-BE49-F238E27FC236}">
-                <a16:creationId xmlns:a16="http://schemas.microsoft.com/office/drawing/2014/main" id="{9C85A215-184B-2105-0279-ED02F6445831}"/>
-              </a:ext>
-            </a:extLst>
-          </p:cNvPr>
+          <p:cNvPr id="6" name="Footer Placeholder 5"/>
           <p:cNvSpPr>
             <a:spLocks noGrp="1"/>
           </p:cNvSpPr>
@@ -3011,13 +2529,7 @@
       </p:sp>
       <p:sp>
         <p:nvSpPr>
-          <p:cNvPr id="7" name="Slide Number Placeholder 6">
-            <a:extLst>
-              <a:ext uri="{FF2B5EF4-FFF2-40B4-BE49-F238E27FC236}">
-                <a16:creationId xmlns:a16="http://schemas.microsoft.com/office/drawing/2014/main" id="{32C7CA46-892B-253A-3A28-7414E17B837B}"/>
-              </a:ext>
-            </a:extLst>
-          </p:cNvPr>
+          <p:cNvPr id="7" name="Slide Number Placeholder 6"/>
           <p:cNvSpPr>
             <a:spLocks noGrp="1"/>
           </p:cNvSpPr>
@@ -3032,18 +2544,12 @@
           <a:p>
             <a:fld id="{CC057153-B650-4DEB-B370-79DDCFDCE934}" type="slidenum">
               <a:rPr lang="en-US" smtClean="0"/>
-              <a:t>‹#›</a:t>
             </a:fld>
             <a:endParaRPr lang="en-US"/>
           </a:p>
         </p:txBody>
       </p:sp>
     </p:spTree>
-    <p:extLst>
-      <p:ext uri="{BB962C8B-B14F-4D97-AF65-F5344CB8AC3E}">
-        <p14:creationId xmlns:p14="http://schemas.microsoft.com/office/powerpoint/2010/main" val="2123987263"/>
-      </p:ext>
-    </p:extLst>
   </p:cSld>
   <p:clrMapOvr>
     <a:masterClrMapping/>
@@ -3070,13 +2576,7 @@
       </p:grpSpPr>
       <p:sp>
         <p:nvSpPr>
-          <p:cNvPr id="2" name="Title 1">
-            <a:extLst>
-              <a:ext uri="{FF2B5EF4-FFF2-40B4-BE49-F238E27FC236}">
-                <a16:creationId xmlns:a16="http://schemas.microsoft.com/office/drawing/2014/main" id="{EFB06A09-98CF-FAC2-3708-AECC4360C651}"/>
-              </a:ext>
-            </a:extLst>
-          </p:cNvPr>
+          <p:cNvPr id="2" name="Title 1"/>
           <p:cNvSpPr>
             <a:spLocks noGrp="1"/>
           </p:cNvSpPr>
@@ -3110,13 +2610,7 @@
       </p:sp>
       <p:sp>
         <p:nvSpPr>
-          <p:cNvPr id="3" name="Picture Placeholder 2">
-            <a:extLst>
-              <a:ext uri="{FF2B5EF4-FFF2-40B4-BE49-F238E27FC236}">
-                <a16:creationId xmlns:a16="http://schemas.microsoft.com/office/drawing/2014/main" id="{9571C769-CEC8-962A-01E6-15B0E056791E}"/>
-              </a:ext>
-            </a:extLst>
-          </p:cNvPr>
+          <p:cNvPr id="3" name="Picture Placeholder 2"/>
           <p:cNvSpPr>
             <a:spLocks noGrp="1"/>
           </p:cNvSpPr>
@@ -3175,18 +2669,13 @@
               <a:rPr lang="en-US"/>
               <a:t>Click icon to add picture</a:t>
             </a:r>
-          </a:p>
-        </p:txBody>
-      </p:sp>
-      <p:sp>
-        <p:nvSpPr>
-          <p:cNvPr id="4" name="Text Placeholder 3">
-            <a:extLst>
-              <a:ext uri="{FF2B5EF4-FFF2-40B4-BE49-F238E27FC236}">
-                <a16:creationId xmlns:a16="http://schemas.microsoft.com/office/drawing/2014/main" id="{F32C4A61-EF2A-C5A5-B150-4448600B3937}"/>
-              </a:ext>
-            </a:extLst>
-          </p:cNvPr>
+            <a:endParaRPr lang="en-US"/>
+          </a:p>
+        </p:txBody>
+      </p:sp>
+      <p:sp>
+        <p:nvSpPr>
+          <p:cNvPr id="4" name="Text Placeholder 3"/>
           <p:cNvSpPr>
             <a:spLocks noGrp="1"/>
           </p:cNvSpPr>
@@ -3246,18 +2735,13 @@
               <a:rPr lang="en-US"/>
               <a:t>Click to edit Master text styles</a:t>
             </a:r>
-          </a:p>
-        </p:txBody>
-      </p:sp>
-      <p:sp>
-        <p:nvSpPr>
-          <p:cNvPr id="5" name="Date Placeholder 4">
-            <a:extLst>
-              <a:ext uri="{FF2B5EF4-FFF2-40B4-BE49-F238E27FC236}">
-                <a16:creationId xmlns:a16="http://schemas.microsoft.com/office/drawing/2014/main" id="{920B235E-39C7-4C78-20EF-DB48ECD9CB90}"/>
-              </a:ext>
-            </a:extLst>
-          </p:cNvPr>
+            <a:endParaRPr lang="en-US"/>
+          </a:p>
+        </p:txBody>
+      </p:sp>
+      <p:sp>
+        <p:nvSpPr>
+          <p:cNvPr id="5" name="Date Placeholder 4"/>
           <p:cNvSpPr>
             <a:spLocks noGrp="1"/>
           </p:cNvSpPr>
@@ -3272,7 +2756,6 @@
           <a:p>
             <a:fld id="{92C5EAEF-6478-4102-8F5D-A5FE9FC97ACB}" type="datetime1">
               <a:rPr lang="en-US" smtClean="0"/>
-              <a:t>2/16/2026</a:t>
             </a:fld>
             <a:endParaRPr lang="en-US"/>
           </a:p>
@@ -3280,13 +2763,7 @@
       </p:sp>
       <p:sp>
         <p:nvSpPr>
-          <p:cNvPr id="6" name="Footer Placeholder 5">
-            <a:extLst>
-              <a:ext uri="{FF2B5EF4-FFF2-40B4-BE49-F238E27FC236}">
-                <a16:creationId xmlns:a16="http://schemas.microsoft.com/office/drawing/2014/main" id="{7FDC75DA-9A78-9AB9-7171-95A08CC51C56}"/>
-              </a:ext>
-            </a:extLst>
-          </p:cNvPr>
+          <p:cNvPr id="6" name="Footer Placeholder 5"/>
           <p:cNvSpPr>
             <a:spLocks noGrp="1"/>
           </p:cNvSpPr>
@@ -3305,13 +2782,7 @@
       </p:sp>
       <p:sp>
         <p:nvSpPr>
-          <p:cNvPr id="7" name="Slide Number Placeholder 6">
-            <a:extLst>
-              <a:ext uri="{FF2B5EF4-FFF2-40B4-BE49-F238E27FC236}">
-                <a16:creationId xmlns:a16="http://schemas.microsoft.com/office/drawing/2014/main" id="{5EFE1A03-DCCB-53C7-DBFE-2AD55C90591B}"/>
-              </a:ext>
-            </a:extLst>
-          </p:cNvPr>
+          <p:cNvPr id="7" name="Slide Number Placeholder 6"/>
           <p:cNvSpPr>
             <a:spLocks noGrp="1"/>
           </p:cNvSpPr>
@@ -3326,18 +2797,12 @@
           <a:p>
             <a:fld id="{CC057153-B650-4DEB-B370-79DDCFDCE934}" type="slidenum">
               <a:rPr lang="en-US" smtClean="0"/>
-              <a:t>‹#›</a:t>
             </a:fld>
             <a:endParaRPr lang="en-US"/>
           </a:p>
         </p:txBody>
       </p:sp>
     </p:spTree>
-    <p:extLst>
-      <p:ext uri="{BB962C8B-B14F-4D97-AF65-F5344CB8AC3E}">
-        <p14:creationId xmlns:p14="http://schemas.microsoft.com/office/powerpoint/2010/main" val="4006722874"/>
-      </p:ext>
-    </p:extLst>
   </p:cSld>
   <p:clrMapOvr>
     <a:masterClrMapping/>
@@ -3369,13 +2834,7 @@
       </p:grpSpPr>
       <p:sp>
         <p:nvSpPr>
-          <p:cNvPr id="2" name="Title Placeholder 1">
-            <a:extLst>
-              <a:ext uri="{FF2B5EF4-FFF2-40B4-BE49-F238E27FC236}">
-                <a16:creationId xmlns:a16="http://schemas.microsoft.com/office/drawing/2014/main" id="{475BFB69-9245-EC58-F1DE-FEB625BD336A}"/>
-              </a:ext>
-            </a:extLst>
-          </p:cNvPr>
+          <p:cNvPr id="2" name="Title Placeholder 1"/>
           <p:cNvSpPr>
             <a:spLocks noGrp="1"/>
           </p:cNvSpPr>
@@ -3408,13 +2867,7 @@
       </p:sp>
       <p:sp>
         <p:nvSpPr>
-          <p:cNvPr id="3" name="Text Placeholder 2">
-            <a:extLst>
-              <a:ext uri="{FF2B5EF4-FFF2-40B4-BE49-F238E27FC236}">
-                <a16:creationId xmlns:a16="http://schemas.microsoft.com/office/drawing/2014/main" id="{5516AFD5-5144-C460-0CA4-644BC4A93C02}"/>
-              </a:ext>
-            </a:extLst>
-          </p:cNvPr>
+          <p:cNvPr id="3" name="Text Placeholder 2"/>
           <p:cNvSpPr>
             <a:spLocks noGrp="1"/>
           </p:cNvSpPr>
@@ -3442,6 +2895,7 @@
               <a:rPr lang="en-US"/>
               <a:t>Click to edit Master text styles</a:t>
             </a:r>
+            <a:endParaRPr lang="en-US"/>
           </a:p>
           <a:p>
             <a:pPr lvl="1"/>
@@ -3449,6 +2903,7 @@
               <a:rPr lang="en-US"/>
               <a:t>Second level</a:t>
             </a:r>
+            <a:endParaRPr lang="en-US"/>
           </a:p>
           <a:p>
             <a:pPr lvl="2"/>
@@ -3456,6 +2911,7 @@
               <a:rPr lang="en-US"/>
               <a:t>Third level</a:t>
             </a:r>
+            <a:endParaRPr lang="en-US"/>
           </a:p>
           <a:p>
             <a:pPr lvl="3"/>
@@ -3463,6 +2919,7 @@
               <a:rPr lang="en-US"/>
               <a:t>Fourth level</a:t>
             </a:r>
+            <a:endParaRPr lang="en-US"/>
           </a:p>
           <a:p>
             <a:pPr lvl="4"/>
@@ -3476,13 +2933,7 @@
       </p:sp>
       <p:sp>
         <p:nvSpPr>
-          <p:cNvPr id="4" name="Date Placeholder 3">
-            <a:extLst>
-              <a:ext uri="{FF2B5EF4-FFF2-40B4-BE49-F238E27FC236}">
-                <a16:creationId xmlns:a16="http://schemas.microsoft.com/office/drawing/2014/main" id="{3995753E-AF8A-7E04-8A1A-205B755A0215}"/>
-              </a:ext>
-            </a:extLst>
-          </p:cNvPr>
+          <p:cNvPr id="4" name="Date Placeholder 3"/>
           <p:cNvSpPr>
             <a:spLocks noGrp="1"/>
           </p:cNvSpPr>
@@ -3513,7 +2964,6 @@
           <a:p>
             <a:fld id="{67F45AC6-C491-4585-A584-9CE2AF7D5500}" type="datetime1">
               <a:rPr lang="en-US" smtClean="0"/>
-              <a:t>2/16/2026</a:t>
             </a:fld>
             <a:endParaRPr lang="en-US"/>
           </a:p>
@@ -3521,13 +2971,7 @@
       </p:sp>
       <p:sp>
         <p:nvSpPr>
-          <p:cNvPr id="5" name="Footer Placeholder 4">
-            <a:extLst>
-              <a:ext uri="{FF2B5EF4-FFF2-40B4-BE49-F238E27FC236}">
-                <a16:creationId xmlns:a16="http://schemas.microsoft.com/office/drawing/2014/main" id="{D4E1B7C8-DA74-800B-EE14-A39E9DB32DE4}"/>
-              </a:ext>
-            </a:extLst>
-          </p:cNvPr>
+          <p:cNvPr id="5" name="Footer Placeholder 4"/>
           <p:cNvSpPr>
             <a:spLocks noGrp="1"/>
           </p:cNvSpPr>
@@ -3562,13 +3006,7 @@
       </p:sp>
       <p:sp>
         <p:nvSpPr>
-          <p:cNvPr id="6" name="Slide Number Placeholder 5">
-            <a:extLst>
-              <a:ext uri="{FF2B5EF4-FFF2-40B4-BE49-F238E27FC236}">
-                <a16:creationId xmlns:a16="http://schemas.microsoft.com/office/drawing/2014/main" id="{7AC1647D-0DF0-CA1B-F723-EF7B8F508DB7}"/>
-              </a:ext>
-            </a:extLst>
-          </p:cNvPr>
+          <p:cNvPr id="6" name="Slide Number Placeholder 5"/>
           <p:cNvSpPr>
             <a:spLocks noGrp="1"/>
           </p:cNvSpPr>
@@ -3599,32 +3037,26 @@
           <a:p>
             <a:fld id="{CC057153-B650-4DEB-B370-79DDCFDCE934}" type="slidenum">
               <a:rPr lang="en-US" smtClean="0"/>
-              <a:t>‹#›</a:t>
             </a:fld>
             <a:endParaRPr lang="en-US"/>
           </a:p>
         </p:txBody>
       </p:sp>
     </p:spTree>
-    <p:extLst>
-      <p:ext uri="{BB962C8B-B14F-4D97-AF65-F5344CB8AC3E}">
-        <p14:creationId xmlns:p14="http://schemas.microsoft.com/office/powerpoint/2010/main" val="1333622939"/>
-      </p:ext>
-    </p:extLst>
   </p:cSld>
   <p:clrMap bg1="lt1" tx1="dk1" bg2="lt2" tx2="dk2" accent1="accent1" accent2="accent2" accent3="accent3" accent4="accent4" accent5="accent5" accent6="accent6" hlink="hlink" folHlink="folHlink"/>
   <p:sldLayoutIdLst>
-    <p:sldLayoutId id="2147483716" r:id="rId1"/>
-    <p:sldLayoutId id="2147483717" r:id="rId2"/>
-    <p:sldLayoutId id="2147483718" r:id="rId3"/>
-    <p:sldLayoutId id="2147483719" r:id="rId4"/>
-    <p:sldLayoutId id="2147483720" r:id="rId5"/>
-    <p:sldLayoutId id="2147483714" r:id="rId6"/>
-    <p:sldLayoutId id="2147483710" r:id="rId7"/>
-    <p:sldLayoutId id="2147483711" r:id="rId8"/>
-    <p:sldLayoutId id="2147483712" r:id="rId9"/>
-    <p:sldLayoutId id="2147483713" r:id="rId10"/>
-    <p:sldLayoutId id="2147483715" r:id="rId11"/>
+    <p:sldLayoutId id="2147483649" r:id="rId1"/>
+    <p:sldLayoutId id="2147483650" r:id="rId2"/>
+    <p:sldLayoutId id="2147483651" r:id="rId3"/>
+    <p:sldLayoutId id="2147483652" r:id="rId4"/>
+    <p:sldLayoutId id="2147483653" r:id="rId5"/>
+    <p:sldLayoutId id="2147483654" r:id="rId6"/>
+    <p:sldLayoutId id="2147483655" r:id="rId7"/>
+    <p:sldLayoutId id="2147483656" r:id="rId8"/>
+    <p:sldLayoutId id="2147483657" r:id="rId9"/>
+    <p:sldLayoutId id="2147483658" r:id="rId10"/>
+    <p:sldLayoutId id="2147483659" r:id="rId11"/>
   </p:sldLayoutIdLst>
   <p:hf sldNum="0" hdr="0" ftr="0" dt="0"/>
   <p:txStyles>
@@ -3937,26 +3369,11 @@
       </p:grpSpPr>
       <p:sp>
         <p:nvSpPr>
-          <p:cNvPr id="10" name="Rectangle 9">
-            <a:extLst>
-              <a:ext uri="{FF2B5EF4-FFF2-40B4-BE49-F238E27FC236}">
-                <a16:creationId xmlns:a16="http://schemas.microsoft.com/office/drawing/2014/main" id="{4D210342-C3F4-5EAC-3A4D-4770C07F3854}"/>
-              </a:ext>
-              <a:ext uri="{C183D7F6-B498-43B3-948B-1728B52AA6E4}">
-                <adec:decorative xmlns:adec="http://schemas.microsoft.com/office/drawing/2017/decorative" val="1"/>
-              </a:ext>
-            </a:extLst>
-          </p:cNvPr>
+          <p:cNvPr id="10" name="Rectangle 9"/>
           <p:cNvSpPr>
             <a:spLocks noGrp="1" noRot="1" noChangeAspect="1" noMove="1" noResize="1" noEditPoints="1" noAdjustHandles="1" noChangeArrowheads="1" noChangeShapeType="1" noTextEdit="1"/>
           </p:cNvSpPr>
-          <p:nvPr>
-            <p:extLst>
-              <p:ext uri="{386F3935-93C4-4BCD-93E2-E3B085C9AB24}">
-                <p16:designElem xmlns:p16="http://schemas.microsoft.com/office/powerpoint/2015/main" val="1"/>
-              </p:ext>
-            </p:extLst>
-          </p:nvPr>
+          <p:nvPr/>
         </p:nvSpPr>
         <p:spPr>
           <a:xfrm>
@@ -3977,7 +3394,7 @@
           <a:effectLst/>
           <a:extLst>
             <a:ext uri="{91240B29-F687-4F45-9708-019B960494DF}">
-              <a14:hiddenLine xmlns:a14="http://schemas.microsoft.com/office/drawing/2010/main" w="12700" cap="flat" cmpd="sng" algn="ctr">
+              <a14:hiddenLine xmlns:a14="http://schemas.microsoft.com/office/drawing/2010/main" w="12700">
                 <a:solidFill>
                   <a:schemeClr val="accent1">
                     <a:shade val="15000"/>
@@ -3985,6 +3402,8 @@
                 </a:solidFill>
                 <a:prstDash val="solid"/>
                 <a:miter lim="800000"/>
+                <a:headEnd/>
+                <a:tailEnd/>
               </a14:hiddenLine>
             </a:ext>
           </a:extLst>
@@ -4016,20 +3435,14 @@
       </p:sp>
       <p:pic>
         <p:nvPicPr>
-          <p:cNvPr id="3" name="Picture 2">
-            <a:extLst>
-              <a:ext uri="{FF2B5EF4-FFF2-40B4-BE49-F238E27FC236}">
-                <a16:creationId xmlns:a16="http://schemas.microsoft.com/office/drawing/2014/main" id="{0DFF8A4A-FFE8-960B-5D80-A8A9E25A82EB}"/>
-              </a:ext>
-            </a:extLst>
-          </p:cNvPr>
+          <p:cNvPr id="3" name="Picture 2"/>
           <p:cNvPicPr>
             <a:picLocks noChangeAspect="1"/>
           </p:cNvPicPr>
           <p:nvPr/>
         </p:nvPicPr>
         <p:blipFill>
-          <a:blip r:embed="rId2"/>
+          <a:blip r:embed="rId1"/>
           <a:srcRect r="235" b="2"/>
           <a:stretch>
             <a:fillRect/>
@@ -4037,8 +3450,8 @@
         </p:blipFill>
         <p:spPr>
           <a:xfrm>
-            <a:off x="1092375" y="1567"/>
-            <a:ext cx="9798485" cy="6858532"/>
+            <a:off x="0" y="9525"/>
+            <a:ext cx="12191365" cy="6858635"/>
           </a:xfrm>
           <a:prstGeom prst="rect">
             <a:avLst/>
@@ -4046,11 +3459,6 @@
         </p:spPr>
       </p:pic>
     </p:spTree>
-    <p:extLst>
-      <p:ext uri="{BB962C8B-B14F-4D97-AF65-F5344CB8AC3E}">
-        <p14:creationId xmlns:p14="http://schemas.microsoft.com/office/powerpoint/2010/main" val="3320114388"/>
-      </p:ext>
-    </p:extLst>
   </p:cSld>
   <p:clrMapOvr>
     <a:masterClrMapping/>
@@ -4077,28 +3485,22 @@
       </p:grpSpPr>
       <p:pic>
         <p:nvPicPr>
-          <p:cNvPr id="3" name="Picture 2">
-            <a:extLst>
-              <a:ext uri="{FF2B5EF4-FFF2-40B4-BE49-F238E27FC236}">
-                <a16:creationId xmlns:a16="http://schemas.microsoft.com/office/drawing/2014/main" id="{C0B7C4C5-F902-638E-8707-0D5D29479F97}"/>
-              </a:ext>
-            </a:extLst>
-          </p:cNvPr>
+          <p:cNvPr id="2" name="Picture 1" descr="A blue watercolor paint with text&#10;&#10;AI-generated content may be incorrect."/>
           <p:cNvPicPr>
             <a:picLocks noChangeAspect="1"/>
           </p:cNvPicPr>
           <p:nvPr/>
         </p:nvPicPr>
         <p:blipFill>
-          <a:blip r:embed="rId2"/>
+          <a:blip r:embed="rId1"/>
           <a:stretch>
             <a:fillRect/>
           </a:stretch>
         </p:blipFill>
         <p:spPr>
           <a:xfrm>
-            <a:off x="1231605" y="0"/>
-            <a:ext cx="9719930" cy="6858000"/>
+            <a:off x="635" y="0"/>
+            <a:ext cx="12192000" cy="6858000"/>
           </a:xfrm>
           <a:prstGeom prst="rect">
             <a:avLst/>
@@ -4106,11 +3508,67 @@
         </p:spPr>
       </p:pic>
     </p:spTree>
-    <p:extLst>
-      <p:ext uri="{BB962C8B-B14F-4D97-AF65-F5344CB8AC3E}">
-        <p14:creationId xmlns:p14="http://schemas.microsoft.com/office/powerpoint/2010/main" val="1939859564"/>
-      </p:ext>
-    </p:extLst>
+  </p:cSld>
+  <p:clrMapOvr>
+    <a:masterClrMapping/>
+  </p:clrMapOvr>
+</p:sld>
+</file>
+
+<file path=ppt/slides/slide3.xml><?xml version="1.0" encoding="utf-8"?>
+<p:sld xmlns:a="http://schemas.openxmlformats.org/drawingml/2006/main" xmlns:r="http://schemas.openxmlformats.org/officeDocument/2006/relationships" xmlns:p="http://schemas.openxmlformats.org/presentationml/2006/main">
+  <p:cSld>
+    <p:bg>
+      <p:bgPr>
+        <a:blipFill>
+          <a:blip r:embed="rId1"/>
+          <a:stretch>
+            <a:fillRect/>
+          </a:stretch>
+        </a:blipFill>
+        <a:effectLst/>
+      </p:bgPr>
+    </p:bg>
+    <p:spTree>
+      <p:nvGrpSpPr>
+        <p:cNvPr id="1" name=""/>
+        <p:cNvGrpSpPr/>
+        <p:nvPr/>
+      </p:nvGrpSpPr>
+      <p:grpSpPr>
+        <a:xfrm>
+          <a:off x="0" y="0"/>
+          <a:ext cx="0" cy="0"/>
+          <a:chOff x="0" y="0"/>
+          <a:chExt cx="0" cy="0"/>
+        </a:xfrm>
+      </p:grpSpPr>
+      <p:pic>
+        <p:nvPicPr>
+          <p:cNvPr id="2" name="Picture 1"/>
+          <p:cNvPicPr>
+            <a:picLocks noChangeAspect="1"/>
+          </p:cNvPicPr>
+          <p:nvPr/>
+        </p:nvPicPr>
+        <p:blipFill>
+          <a:blip r:embed="rId1"/>
+          <a:srcRect/>
+          <a:stretch>
+            <a:fillRect/>
+          </a:stretch>
+        </p:blipFill>
+        <p:spPr>
+          <a:xfrm>
+            <a:off x="0" y="0"/>
+            <a:ext cx="12191365" cy="6858000"/>
+          </a:xfrm>
+          <a:prstGeom prst="rect">
+            <a:avLst/>
+          </a:prstGeom>
+        </p:spPr>
+      </p:pic>
+    </p:spTree>
   </p:cSld>
   <p:clrMapOvr>
     <a:masterClrMapping/>
@@ -4309,18 +3767,269 @@
       </a:bgFillStyleLst>
     </a:fmtScheme>
   </a:themeElements>
-  <a:objectDefaults/>
-  <a:extraClrSchemeLst/>
   <a:extLst>
     <a:ext uri="{05A4C25C-085E-4340-85A3-A5531E510DB2}">
-      <thm15:themeFamily xmlns:thm15="http://schemas.microsoft.com/office/thememl/2012/main" name="VanillaVTI" id="{54D376C6-1C9B-4C6B-8F3C-483BB307BB05}" vid="{7690D8A9-C071-45EF-BA7A-F7FA9779B11D}"/>
+      <thm15:themeFamily xmlns:thm15="http://schemas.microsoft.com/office/thememl/2012/main" name="Office Theme" id="{62F939B6-93AF-4DB8-9C6B-D6C7DFDC589F}" vid="{4A3C46E8-61CC-4603-A589-7422A47A8E4A}"/>
     </a:ext>
   </a:extLst>
 </a:theme>
 </file>
 
-<file path=docMetadata/LabelInfo.xml><?xml version="1.0" encoding="utf-8"?>
-<clbl:labelList xmlns:clbl="http://schemas.microsoft.com/office/2020/mipLabelMetadata">
-  <clbl:label id="{a2761ec8-7198-4440-bea0-e9dd2af28b51}" enabled="1" method="Standard" siteId="{73e15cf5-5dbb-46af-a862-753916269d73}" removed="0"/>
-</clbl:labelList>
+<file path=ppt/theme/theme2.xml><?xml version="1.0" encoding="utf-8"?>
+<a:theme xmlns:a="http://schemas.openxmlformats.org/drawingml/2006/main" name="Office Theme">
+  <a:themeElements>
+    <a:clrScheme name="Office">
+      <a:dk1>
+        <a:sysClr val="windowText" lastClr="000000"/>
+      </a:dk1>
+      <a:lt1>
+        <a:sysClr val="window" lastClr="FFFFFF"/>
+      </a:lt1>
+      <a:dk2>
+        <a:srgbClr val="44546A"/>
+      </a:dk2>
+      <a:lt2>
+        <a:srgbClr val="E7E6E6"/>
+      </a:lt2>
+      <a:accent1>
+        <a:srgbClr val="5B9BD5"/>
+      </a:accent1>
+      <a:accent2>
+        <a:srgbClr val="ED7D31"/>
+      </a:accent2>
+      <a:accent3>
+        <a:srgbClr val="A5A5A5"/>
+      </a:accent3>
+      <a:accent4>
+        <a:srgbClr val="FFC000"/>
+      </a:accent4>
+      <a:accent5>
+        <a:srgbClr val="4472C4"/>
+      </a:accent5>
+      <a:accent6>
+        <a:srgbClr val="70AD47"/>
+      </a:accent6>
+      <a:hlink>
+        <a:srgbClr val="0563C1"/>
+      </a:hlink>
+      <a:folHlink>
+        <a:srgbClr val="954F72"/>
+      </a:folHlink>
+    </a:clrScheme>
+    <a:fontScheme name="Office">
+      <a:majorFont>
+        <a:latin typeface="Calibri Light"/>
+        <a:ea typeface=""/>
+        <a:cs typeface=""/>
+        <a:font script="Jpan" typeface="ＭＳ Ｐゴシック"/>
+        <a:font script="Hang" typeface="맑은 고딕"/>
+        <a:font script="Hans" typeface="宋体"/>
+        <a:font script="Hant" typeface="新細明體"/>
+        <a:font script="Arab" typeface="Times New Roman"/>
+        <a:font script="Hebr" typeface="Times New Roman"/>
+        <a:font script="Thai" typeface="Angsana New"/>
+        <a:font script="Ethi" typeface="Nyala"/>
+        <a:font script="Beng" typeface="Vrinda"/>
+        <a:font script="Gujr" typeface="Shruti"/>
+        <a:font script="Khmr" typeface="MoolBoran"/>
+        <a:font script="Knda" typeface="Tunga"/>
+        <a:font script="Guru" typeface="Raavi"/>
+        <a:font script="Cans" typeface="Euphemia"/>
+        <a:font script="Cher" typeface="Plantagenet Cherokee"/>
+        <a:font script="Yiii" typeface="Microsoft Yi Baiti"/>
+        <a:font script="Tibt" typeface="Microsoft Himalaya"/>
+        <a:font script="Thaa" typeface="MV Boli"/>
+        <a:font script="Deva" typeface="Mangal"/>
+        <a:font script="Telu" typeface="Gautami"/>
+        <a:font script="Taml" typeface="Latha"/>
+        <a:font script="Syrc" typeface="Estrangelo Edessa"/>
+        <a:font script="Orya" typeface="Kalinga"/>
+        <a:font script="Mlym" typeface="Kartika"/>
+        <a:font script="Laoo" typeface="DokChampa"/>
+        <a:font script="Sinh" typeface="Iskoola Pota"/>
+        <a:font script="Mong" typeface="Mongolian Baiti"/>
+        <a:font script="Viet" typeface="Times New Roman"/>
+        <a:font script="Uigh" typeface="Microsoft Uighur"/>
+        <a:font script="Geor" typeface="Sylfaen"/>
+      </a:majorFont>
+      <a:minorFont>
+        <a:latin typeface="Calibri"/>
+        <a:ea typeface=""/>
+        <a:cs typeface=""/>
+        <a:font script="Jpan" typeface="ＭＳ Ｐゴシック"/>
+        <a:font script="Hang" typeface="맑은 고딕"/>
+        <a:font script="Hans" typeface="宋体"/>
+        <a:font script="Hant" typeface="新細明體"/>
+        <a:font script="Arab" typeface="Arial"/>
+        <a:font script="Hebr" typeface="Arial"/>
+        <a:font script="Thai" typeface="Cordia New"/>
+        <a:font script="Ethi" typeface="Nyala"/>
+        <a:font script="Beng" typeface="Vrinda"/>
+        <a:font script="Gujr" typeface="Shruti"/>
+        <a:font script="Khmr" typeface="DaunPenh"/>
+        <a:font script="Knda" typeface="Tunga"/>
+        <a:font script="Guru" typeface="Raavi"/>
+        <a:font script="Cans" typeface="Euphemia"/>
+        <a:font script="Cher" typeface="Plantagenet Cherokee"/>
+        <a:font script="Yiii" typeface="Microsoft Yi Baiti"/>
+        <a:font script="Tibt" typeface="Microsoft Himalaya"/>
+        <a:font script="Thaa" typeface="MV Boli"/>
+        <a:font script="Deva" typeface="Mangal"/>
+        <a:font script="Telu" typeface="Gautami"/>
+        <a:font script="Taml" typeface="Latha"/>
+        <a:font script="Syrc" typeface="Estrangelo Edessa"/>
+        <a:font script="Orya" typeface="Kalinga"/>
+        <a:font script="Mlym" typeface="Kartika"/>
+        <a:font script="Laoo" typeface="DokChampa"/>
+        <a:font script="Sinh" typeface="Iskoola Pota"/>
+        <a:font script="Mong" typeface="Mongolian Baiti"/>
+        <a:font script="Viet" typeface="Arial"/>
+        <a:font script="Uigh" typeface="Microsoft Uighur"/>
+        <a:font script="Geor" typeface="Sylfaen"/>
+      </a:minorFont>
+    </a:fontScheme>
+    <a:fmtScheme name="Office">
+      <a:fillStyleLst>
+        <a:solidFill>
+          <a:schemeClr val="phClr"/>
+        </a:solidFill>
+        <a:gradFill rotWithShape="1">
+          <a:gsLst>
+            <a:gs pos="0">
+              <a:schemeClr val="phClr">
+                <a:lumMod val="110000"/>
+                <a:satMod val="105000"/>
+                <a:tint val="67000"/>
+              </a:schemeClr>
+            </a:gs>
+            <a:gs pos="50000">
+              <a:schemeClr val="phClr">
+                <a:lumMod val="105000"/>
+                <a:satMod val="103000"/>
+                <a:tint val="73000"/>
+              </a:schemeClr>
+            </a:gs>
+            <a:gs pos="100000">
+              <a:schemeClr val="phClr">
+                <a:lumMod val="105000"/>
+                <a:satMod val="109000"/>
+                <a:tint val="81000"/>
+              </a:schemeClr>
+            </a:gs>
+          </a:gsLst>
+          <a:lin ang="5400000" scaled="0"/>
+        </a:gradFill>
+        <a:gradFill rotWithShape="1">
+          <a:gsLst>
+            <a:gs pos="0">
+              <a:schemeClr val="phClr">
+                <a:satMod val="103000"/>
+                <a:lumMod val="102000"/>
+                <a:tint val="94000"/>
+              </a:schemeClr>
+            </a:gs>
+            <a:gs pos="50000">
+              <a:schemeClr val="phClr">
+                <a:satMod val="110000"/>
+                <a:lumMod val="100000"/>
+                <a:shade val="100000"/>
+              </a:schemeClr>
+            </a:gs>
+            <a:gs pos="100000">
+              <a:schemeClr val="phClr">
+                <a:lumMod val="99000"/>
+                <a:satMod val="120000"/>
+                <a:shade val="78000"/>
+              </a:schemeClr>
+            </a:gs>
+          </a:gsLst>
+          <a:lin ang="5400000" scaled="0"/>
+        </a:gradFill>
+      </a:fillStyleLst>
+      <a:lnStyleLst>
+        <a:ln w="6350" cap="flat" cmpd="sng" algn="ctr">
+          <a:solidFill>
+            <a:schemeClr val="phClr"/>
+          </a:solidFill>
+          <a:prstDash val="solid"/>
+          <a:miter lim="800000"/>
+        </a:ln>
+        <a:ln w="12700" cap="flat" cmpd="sng" algn="ctr">
+          <a:solidFill>
+            <a:schemeClr val="phClr"/>
+          </a:solidFill>
+          <a:prstDash val="solid"/>
+          <a:miter lim="800000"/>
+        </a:ln>
+        <a:ln w="19050" cap="flat" cmpd="sng" algn="ctr">
+          <a:solidFill>
+            <a:schemeClr val="phClr"/>
+          </a:solidFill>
+          <a:prstDash val="solid"/>
+          <a:miter lim="800000"/>
+        </a:ln>
+      </a:lnStyleLst>
+      <a:effectStyleLst>
+        <a:effectStyle>
+          <a:effectLst/>
+        </a:effectStyle>
+        <a:effectStyle>
+          <a:effectLst/>
+        </a:effectStyle>
+        <a:effectStyle>
+          <a:effectLst>
+            <a:outerShdw blurRad="57150" dist="19050" dir="5400000" algn="ctr" rotWithShape="0">
+              <a:srgbClr val="000000">
+                <a:alpha val="63000"/>
+              </a:srgbClr>
+            </a:outerShdw>
+          </a:effectLst>
+        </a:effectStyle>
+      </a:effectStyleLst>
+      <a:bgFillStyleLst>
+        <a:solidFill>
+          <a:schemeClr val="phClr"/>
+        </a:solidFill>
+        <a:solidFill>
+          <a:schemeClr val="phClr">
+            <a:tint val="95000"/>
+            <a:satMod val="170000"/>
+          </a:schemeClr>
+        </a:solidFill>
+        <a:gradFill rotWithShape="1">
+          <a:gsLst>
+            <a:gs pos="0">
+              <a:schemeClr val="phClr">
+                <a:tint val="93000"/>
+                <a:satMod val="150000"/>
+                <a:shade val="98000"/>
+                <a:lumMod val="102000"/>
+              </a:schemeClr>
+            </a:gs>
+            <a:gs pos="50000">
+              <a:schemeClr val="phClr">
+                <a:tint val="98000"/>
+                <a:satMod val="130000"/>
+                <a:shade val="90000"/>
+                <a:lumMod val="103000"/>
+              </a:schemeClr>
+            </a:gs>
+            <a:gs pos="100000">
+              <a:schemeClr val="phClr">
+                <a:shade val="63000"/>
+                <a:satMod val="120000"/>
+              </a:schemeClr>
+            </a:gs>
+          </a:gsLst>
+          <a:lin ang="5400000" scaled="0"/>
+        </a:gradFill>
+      </a:bgFillStyleLst>
+    </a:fmtScheme>
+  </a:themeElements>
+  <a:extLst>
+    <a:ext uri="{05A4C25C-085E-4340-85A3-A5531E510DB2}">
+      <thm15:themeFamily xmlns:thm15="http://schemas.microsoft.com/office/thememl/2012/main" name="Office Theme" id="{62F939B6-93AF-4DB8-9C6B-D6C7DFDC589F}" vid="{4A3C46E8-61CC-4603-A589-7422A47A8E4A}"/>
+    </a:ext>
+  </a:extLst>
+</a:theme>
 </file>
</xml_diff>